<commit_message>
Updated for Use cases
</commit_message>
<xml_diff>
--- a/scenarios/Azure Security - Proof of concepts.pptx
+++ b/scenarios/Azure Security - Proof of concepts.pptx
@@ -556,20 +556,20 @@
             <ac:picMk id="66" creationId="{3C3AA10A-E028-4A43-9144-28202BCCE986}"/>
           </ac:picMkLst>
         </pc:picChg>
+        <pc:picChg chg="add mod">
+          <ac:chgData name="Shabuddin Khan" userId="6572cdad-dc51-4cbc-b875-d48199489fd3" providerId="ADAL" clId="{FA00299C-1677-4761-8860-DECAFE39DA97}" dt="2018-03-21T06:55:13.999" v="2278" actId="1036"/>
+          <ac:picMkLst>
+            <pc:docMk/>
+            <pc:sldMk cId="3720355804" sldId="263"/>
+            <ac:picMk id="1026" creationId="{BF9AB754-2EDE-4BDE-9592-D43702A5C6B2}"/>
+          </ac:picMkLst>
+        </pc:picChg>
         <pc:picChg chg="add del mod">
           <ac:chgData name="Shabuddin Khan" userId="6572cdad-dc51-4cbc-b875-d48199489fd3" providerId="ADAL" clId="{FA00299C-1677-4761-8860-DECAFE39DA97}" dt="2018-03-19T09:15:48.842" v="663" actId="478"/>
           <ac:picMkLst>
             <pc:docMk/>
             <pc:sldMk cId="3720355804" sldId="263"/>
             <ac:picMk id="1026" creationId="{52B52617-ED15-476F-8F7D-494DA9708099}"/>
-          </ac:picMkLst>
-        </pc:picChg>
-        <pc:picChg chg="add mod">
-          <ac:chgData name="Shabuddin Khan" userId="6572cdad-dc51-4cbc-b875-d48199489fd3" providerId="ADAL" clId="{FA00299C-1677-4761-8860-DECAFE39DA97}" dt="2018-03-21T06:55:13.999" v="2278" actId="1036"/>
-          <ac:picMkLst>
-            <pc:docMk/>
-            <pc:sldMk cId="3720355804" sldId="263"/>
-            <ac:picMk id="1026" creationId="{BF9AB754-2EDE-4BDE-9592-D43702A5C6B2}"/>
           </ac:picMkLst>
         </pc:picChg>
         <pc:picChg chg="add del mod">
@@ -8487,7 +8487,7 @@
           <a:p>
             <a:fld id="{53C998D3-C819-412A-870D-D0AAEB5CD01C}" type="datetimeFigureOut">
               <a:rPr lang="en-US" smtClean="0"/>
-              <a:t>3/30/2018</a:t>
+              <a:t>4/4/2018</a:t>
             </a:fld>
             <a:endParaRPr lang="en-US"/>
           </a:p>
@@ -8685,7 +8685,7 @@
           <a:p>
             <a:fld id="{53C998D3-C819-412A-870D-D0AAEB5CD01C}" type="datetimeFigureOut">
               <a:rPr lang="en-US" smtClean="0"/>
-              <a:t>3/30/2018</a:t>
+              <a:t>4/4/2018</a:t>
             </a:fld>
             <a:endParaRPr lang="en-US"/>
           </a:p>
@@ -8893,7 +8893,7 @@
           <a:p>
             <a:fld id="{53C998D3-C819-412A-870D-D0AAEB5CD01C}" type="datetimeFigureOut">
               <a:rPr lang="en-US" smtClean="0"/>
-              <a:t>3/30/2018</a:t>
+              <a:t>4/4/2018</a:t>
             </a:fld>
             <a:endParaRPr lang="en-US"/>
           </a:p>
@@ -9101,7 +9101,7 @@
           <a:p>
             <a:fld id="{53C998D3-C819-412A-870D-D0AAEB5CD01C}" type="datetimeFigureOut">
               <a:rPr lang="en-US" smtClean="0"/>
-              <a:t>3/30/2018</a:t>
+              <a:t>4/4/2018</a:t>
             </a:fld>
             <a:endParaRPr lang="en-US"/>
           </a:p>
@@ -9376,7 +9376,7 @@
           <a:p>
             <a:fld id="{53C998D3-C819-412A-870D-D0AAEB5CD01C}" type="datetimeFigureOut">
               <a:rPr lang="en-US" smtClean="0"/>
-              <a:t>3/30/2018</a:t>
+              <a:t>4/4/2018</a:t>
             </a:fld>
             <a:endParaRPr lang="en-US"/>
           </a:p>
@@ -9641,7 +9641,7 @@
           <a:p>
             <a:fld id="{53C998D3-C819-412A-870D-D0AAEB5CD01C}" type="datetimeFigureOut">
               <a:rPr lang="en-US" smtClean="0"/>
-              <a:t>3/30/2018</a:t>
+              <a:t>4/4/2018</a:t>
             </a:fld>
             <a:endParaRPr lang="en-US"/>
           </a:p>
@@ -10053,7 +10053,7 @@
           <a:p>
             <a:fld id="{53C998D3-C819-412A-870D-D0AAEB5CD01C}" type="datetimeFigureOut">
               <a:rPr lang="en-US" smtClean="0"/>
-              <a:t>3/30/2018</a:t>
+              <a:t>4/4/2018</a:t>
             </a:fld>
             <a:endParaRPr lang="en-US"/>
           </a:p>
@@ -10201,7 +10201,7 @@
           <a:p>
             <a:fld id="{53C998D3-C819-412A-870D-D0AAEB5CD01C}" type="datetimeFigureOut">
               <a:rPr lang="en-US" smtClean="0"/>
-              <a:t>3/30/2018</a:t>
+              <a:t>4/4/2018</a:t>
             </a:fld>
             <a:endParaRPr lang="en-US"/>
           </a:p>
@@ -10360,7 +10360,7 @@
           <a:p>
             <a:fld id="{53C998D3-C819-412A-870D-D0AAEB5CD01C}" type="datetimeFigureOut">
               <a:rPr lang="en-US" smtClean="0"/>
-              <a:t>3/30/2018</a:t>
+              <a:t>4/4/2018</a:t>
             </a:fld>
             <a:endParaRPr lang="en-US"/>
           </a:p>
@@ -10671,7 +10671,7 @@
           <a:p>
             <a:fld id="{53C998D3-C819-412A-870D-D0AAEB5CD01C}" type="datetimeFigureOut">
               <a:rPr lang="en-US" smtClean="0"/>
-              <a:t>3/30/2018</a:t>
+              <a:t>4/4/2018</a:t>
             </a:fld>
             <a:endParaRPr lang="en-US"/>
           </a:p>
@@ -10962,7 +10962,7 @@
           <a:p>
             <a:fld id="{53C998D3-C819-412A-870D-D0AAEB5CD01C}" type="datetimeFigureOut">
               <a:rPr lang="en-US" smtClean="0"/>
-              <a:t>3/30/2018</a:t>
+              <a:t>4/4/2018</a:t>
             </a:fld>
             <a:endParaRPr lang="en-US"/>
           </a:p>
@@ -11212,7 +11212,7 @@
           <a:p>
             <a:fld id="{53C998D3-C819-412A-870D-D0AAEB5CD01C}" type="datetimeFigureOut">
               <a:rPr lang="en-US" smtClean="0"/>
-              <a:t>3/30/2018</a:t>
+              <a:t>4/4/2018</a:t>
             </a:fld>
             <a:endParaRPr lang="en-US"/>
           </a:p>
@@ -12856,7 +12856,7 @@
           <a:p>
             <a:r>
               <a:rPr lang="en-US" sz="2800" dirty="0"/>
-              <a:t>Scenario 1</a:t>
+              <a:t>Use case 1</a:t>
             </a:r>
           </a:p>
         </p:txBody>
@@ -14219,7 +14219,7 @@
           <a:p>
             <a:r>
               <a:rPr lang="en-US" sz="2800" dirty="0"/>
-              <a:t>Scenario 2</a:t>
+              <a:t>Use case 2</a:t>
             </a:r>
           </a:p>
         </p:txBody>
@@ -15435,7 +15435,7 @@
           <a:p>
             <a:r>
               <a:rPr lang="en-US" sz="2800" dirty="0"/>
-              <a:t>Scenario 3</a:t>
+              <a:t>Use case 3</a:t>
             </a:r>
           </a:p>
         </p:txBody>
@@ -16400,7 +16400,7 @@
           <a:p>
             <a:r>
               <a:rPr lang="en-US" sz="2800" dirty="0"/>
-              <a:t>Scenario 1</a:t>
+              <a:t>Use case 1</a:t>
             </a:r>
           </a:p>
         </p:txBody>
@@ -17463,7 +17463,7 @@
         <p:spPr>
           <a:xfrm>
             <a:off x="3501846" y="5400892"/>
-            <a:ext cx="1366089" cy="523220"/>
+            <a:ext cx="1366089" cy="307777"/>
           </a:xfrm>
           <a:prstGeom prst="rect">
             <a:avLst/>
@@ -17482,7 +17482,7 @@
                   <a:srgbClr val="FF0000"/>
                 </a:solidFill>
               </a:rPr>
-              <a:t>SQL Injection Attack</a:t>
+              <a:t>XSS Attack</a:t>
             </a:r>
           </a:p>
         </p:txBody>
@@ -17563,8 +17563,12 @@
           <a:lstStyle/>
           <a:p>
             <a:r>
+              <a:rPr lang="en-US" sz="2800"/>
+              <a:t>Use case </a:t>
+            </a:r>
+            <a:r>
               <a:rPr lang="en-US" sz="2800" dirty="0"/>
-              <a:t>Scenario 2</a:t>
+              <a:t>2</a:t>
             </a:r>
           </a:p>
         </p:txBody>
@@ -30652,21 +30656,6 @@
 </file>
 
 <file path=customXml/item1.xml><?xml version="1.0" encoding="utf-8"?>
-<p:properties xmlns:p="http://schemas.microsoft.com/office/2006/metadata/properties" xmlns:xsi="http://www.w3.org/2001/XMLSchema-instance" xmlns:pc="http://schemas.microsoft.com/office/infopath/2007/PartnerControls">
-  <documentManagement/>
-</p:properties>
-</file>
-
-<file path=customXml/item2.xml><?xml version="1.0" encoding="utf-8"?>
-<?mso-contentType ?>
-<FormTemplates xmlns="http://schemas.microsoft.com/sharepoint/v3/contenttype/forms">
-  <Display>DocumentLibraryForm</Display>
-  <Edit>DocumentLibraryForm</Edit>
-  <New>DocumentLibraryForm</New>
-</FormTemplates>
-</file>
-
-<file path=customXml/item3.xml><?xml version="1.0" encoding="utf-8"?>
 <ct:contentTypeSchema xmlns:ct="http://schemas.microsoft.com/office/2006/metadata/contentType" xmlns:ma="http://schemas.microsoft.com/office/2006/metadata/properties/metaAttributes" ct:_="" ma:_="" ma:contentTypeName="Document" ma:contentTypeID="0x0101003D63ADDD7F57C84B8D529CA73E1B98CB" ma:contentTypeVersion="7" ma:contentTypeDescription="Create a new document." ma:contentTypeScope="" ma:versionID="9064f22c5fb9dbe79858a8cdf6e712ce">
   <xsd:schema xmlns:xsd="http://www.w3.org/2001/XMLSchema" xmlns:xs="http://www.w3.org/2001/XMLSchema" xmlns:p="http://schemas.microsoft.com/office/2006/metadata/properties" xmlns:ns2="0a1749d7-1680-4b4c-ac1a-b66627f7b711" xmlns:ns3="625b0429-57c0-41ed-b4b9-cb84fb06689a" targetNamespace="http://schemas.microsoft.com/office/2006/metadata/properties" ma:root="true" ma:fieldsID="cf1e750c1e05d2200690044012d38e6b" ns2:_="" ns3:_="">
     <xsd:import namespace="0a1749d7-1680-4b4c-ac1a-b66627f7b711"/>
@@ -30851,32 +30840,22 @@
 </ct:contentTypeSchema>
 </file>
 
-<file path=customXml/itemProps1.xml><?xml version="1.0" encoding="utf-8"?>
-<ds:datastoreItem xmlns:ds="http://schemas.openxmlformats.org/officeDocument/2006/customXml" ds:itemID="{2BC4359B-39BF-4631-A3A8-18D4D323FA7C}">
-  <ds:schemaRefs>
-    <ds:schemaRef ds:uri="http://schemas.microsoft.com/office/2006/documentManagement/types"/>
-    <ds:schemaRef ds:uri="http://schemas.openxmlformats.org/package/2006/metadata/core-properties"/>
-    <ds:schemaRef ds:uri="http://purl.org/dc/elements/1.1/"/>
-    <ds:schemaRef ds:uri="http://purl.org/dc/dcmitype/"/>
-    <ds:schemaRef ds:uri="http://schemas.microsoft.com/office/infopath/2007/PartnerControls"/>
-    <ds:schemaRef ds:uri="http://purl.org/dc/terms/"/>
-    <ds:schemaRef ds:uri="625b0429-57c0-41ed-b4b9-cb84fb06689a"/>
-    <ds:schemaRef ds:uri="0a1749d7-1680-4b4c-ac1a-b66627f7b711"/>
-    <ds:schemaRef ds:uri="http://schemas.microsoft.com/office/2006/metadata/properties"/>
-    <ds:schemaRef ds:uri="http://www.w3.org/XML/1998/namespace"/>
-  </ds:schemaRefs>
-</ds:datastoreItem>
+<file path=customXml/item2.xml><?xml version="1.0" encoding="utf-8"?>
+<?mso-contentType ?>
+<FormTemplates xmlns="http://schemas.microsoft.com/sharepoint/v3/contenttype/forms">
+  <Display>DocumentLibraryForm</Display>
+  <Edit>DocumentLibraryForm</Edit>
+  <New>DocumentLibraryForm</New>
+</FormTemplates>
 </file>
 
-<file path=customXml/itemProps2.xml><?xml version="1.0" encoding="utf-8"?>
-<ds:datastoreItem xmlns:ds="http://schemas.openxmlformats.org/officeDocument/2006/customXml" ds:itemID="{B3F2B111-B156-46F7-9CCE-060B68D70E39}">
-  <ds:schemaRefs>
-    <ds:schemaRef ds:uri="http://schemas.microsoft.com/sharepoint/v3/contenttype/forms"/>
-  </ds:schemaRefs>
-</ds:datastoreItem>
+<file path=customXml/item3.xml><?xml version="1.0" encoding="utf-8"?>
+<p:properties xmlns:p="http://schemas.microsoft.com/office/2006/metadata/properties" xmlns:xsi="http://www.w3.org/2001/XMLSchema-instance" xmlns:pc="http://schemas.microsoft.com/office/infopath/2007/PartnerControls">
+  <documentManagement/>
+</p:properties>
 </file>
 
-<file path=customXml/itemProps3.xml><?xml version="1.0" encoding="utf-8"?>
+<file path=customXml/itemProps1.xml><?xml version="1.0" encoding="utf-8"?>
 <ds:datastoreItem xmlns:ds="http://schemas.openxmlformats.org/officeDocument/2006/customXml" ds:itemID="{4603885D-4C39-42A8-AC71-854EFA531F1A}">
   <ds:schemaRefs>
     <ds:schemaRef ds:uri="http://schemas.microsoft.com/office/2006/metadata/contentType"/>
@@ -30893,4 +30872,29 @@
     <ds:schemaRef ds:uri="http://schemas.microsoft.com/internal/obd"/>
   </ds:schemaRefs>
 </ds:datastoreItem>
+</file>
+
+<file path=customXml/itemProps2.xml><?xml version="1.0" encoding="utf-8"?>
+<ds:datastoreItem xmlns:ds="http://schemas.openxmlformats.org/officeDocument/2006/customXml" ds:itemID="{B3F2B111-B156-46F7-9CCE-060B68D70E39}">
+  <ds:schemaRefs>
+    <ds:schemaRef ds:uri="http://schemas.microsoft.com/sharepoint/v3/contenttype/forms"/>
+  </ds:schemaRefs>
+</ds:datastoreItem>
+</file>
+
+<file path=customXml/itemProps3.xml><?xml version="1.0" encoding="utf-8"?>
+<ds:datastoreItem xmlns:ds="http://schemas.openxmlformats.org/officeDocument/2006/customXml" ds:itemID="{2BC4359B-39BF-4631-A3A8-18D4D323FA7C}">
+  <ds:schemaRefs>
+    <ds:schemaRef ds:uri="http://schemas.microsoft.com/office/2006/documentManagement/types"/>
+    <ds:schemaRef ds:uri="http://schemas.openxmlformats.org/package/2006/metadata/core-properties"/>
+    <ds:schemaRef ds:uri="http://purl.org/dc/elements/1.1/"/>
+    <ds:schemaRef ds:uri="http://purl.org/dc/dcmitype/"/>
+    <ds:schemaRef ds:uri="http://schemas.microsoft.com/office/infopath/2007/PartnerControls"/>
+    <ds:schemaRef ds:uri="http://purl.org/dc/terms/"/>
+    <ds:schemaRef ds:uri="625b0429-57c0-41ed-b4b9-cb84fb06689a"/>
+    <ds:schemaRef ds:uri="0a1749d7-1680-4b4c-ac1a-b66627f7b711"/>
+    <ds:schemaRef ds:uri="http://schemas.microsoft.com/office/2006/metadata/properties"/>
+    <ds:schemaRef ds:uri="http://www.w3.org/XML/1998/namespace"/>
+  </ds:schemaRefs>
+</ds:datastoreItem>
 </file>
</xml_diff>

<commit_message>
Updated POC ppt for ddos
</commit_message>
<xml_diff>
--- a/scenarios/Azure Security - Proof of concepts.pptx
+++ b/scenarios/Azure Security - Proof of concepts.pptx
@@ -125,570 +125,6 @@
     </p:ext>
   </p:extLst>
 </p:presentation>
-</file>
-
-<file path=ppt/changesInfos/changesInfo1.xml><?xml version="1.0" encoding="utf-8"?>
-<pc:chgInfo xmlns:a="http://schemas.openxmlformats.org/drawingml/2006/main" xmlns:r="http://schemas.openxmlformats.org/officeDocument/2006/relationships" xmlns:ac="http://schemas.microsoft.com/office/drawing/2013/main/command" xmlns:pc="http://schemas.microsoft.com/office/powerpoint/2013/main/command">
-  <pc:docChgLst>
-    <pc:chgData name="Shabuddin Khan" userId="6572cdad-dc51-4cbc-b875-d48199489fd3" providerId="ADAL" clId="{FA00299C-1677-4761-8860-DECAFE39DA97}"/>
-    <pc:docChg chg="undo redo custSel addSld modSld">
-      <pc:chgData name="Shabuddin Khan" userId="6572cdad-dc51-4cbc-b875-d48199489fd3" providerId="ADAL" clId="{FA00299C-1677-4761-8860-DECAFE39DA97}" dt="2018-03-21T16:50:34.334" v="2517" actId="122"/>
-      <pc:docMkLst>
-        <pc:docMk/>
-      </pc:docMkLst>
-      <pc:sldChg chg="addSp delSp modSp add addAnim delAnim modAnim">
-        <pc:chgData name="Shabuddin Khan" userId="6572cdad-dc51-4cbc-b875-d48199489fd3" providerId="ADAL" clId="{FA00299C-1677-4761-8860-DECAFE39DA97}" dt="2018-03-21T10:52:41.847" v="2387" actId="122"/>
-        <pc:sldMkLst>
-          <pc:docMk/>
-          <pc:sldMk cId="3720355804" sldId="263"/>
-        </pc:sldMkLst>
-        <pc:spChg chg="mod">
-          <ac:chgData name="Shabuddin Khan" userId="6572cdad-dc51-4cbc-b875-d48199489fd3" providerId="ADAL" clId="{FA00299C-1677-4761-8860-DECAFE39DA97}" dt="2018-03-21T10:46:32.022" v="2361" actId="1076"/>
-          <ac:spMkLst>
-            <pc:docMk/>
-            <pc:sldMk cId="3720355804" sldId="263"/>
-            <ac:spMk id="2" creationId="{C8722A03-555A-4CAC-B46F-8E44301713BA}"/>
-          </ac:spMkLst>
-        </pc:spChg>
-        <pc:spChg chg="del">
-          <ac:chgData name="Shabuddin Khan" userId="6572cdad-dc51-4cbc-b875-d48199489fd3" providerId="ADAL" clId="{FA00299C-1677-4761-8860-DECAFE39DA97}" dt="2018-03-19T07:08:43.826" v="46" actId="478"/>
-          <ac:spMkLst>
-            <pc:docMk/>
-            <pc:sldMk cId="3720355804" sldId="263"/>
-            <ac:spMk id="3" creationId="{F8EF44F8-5B74-4BC1-81C0-CBA6778E000F}"/>
-          </ac:spMkLst>
-        </pc:spChg>
-        <pc:spChg chg="add mod">
-          <ac:chgData name="Shabuddin Khan" userId="6572cdad-dc51-4cbc-b875-d48199489fd3" providerId="ADAL" clId="{FA00299C-1677-4761-8860-DECAFE39DA97}" dt="2018-03-19T09:36:35.612" v="1007" actId="1076"/>
-          <ac:spMkLst>
-            <pc:docMk/>
-            <pc:sldMk cId="3720355804" sldId="263"/>
-            <ac:spMk id="4" creationId="{F3085B89-1CA0-4174-B279-1F818E5AFEB0}"/>
-          </ac:spMkLst>
-        </pc:spChg>
-        <pc:spChg chg="add del mod">
-          <ac:chgData name="Shabuddin Khan" userId="6572cdad-dc51-4cbc-b875-d48199489fd3" providerId="ADAL" clId="{FA00299C-1677-4761-8860-DECAFE39DA97}" dt="2018-03-19T07:21:34.313" v="59" actId="478"/>
-          <ac:spMkLst>
-            <pc:docMk/>
-            <pc:sldMk cId="3720355804" sldId="263"/>
-            <ac:spMk id="5" creationId="{7A318EC7-E20F-4A15-AEE1-EE7C39183B6A}"/>
-          </ac:spMkLst>
-        </pc:spChg>
-        <pc:spChg chg="add del mod">
-          <ac:chgData name="Shabuddin Khan" userId="6572cdad-dc51-4cbc-b875-d48199489fd3" providerId="ADAL" clId="{FA00299C-1677-4761-8860-DECAFE39DA97}" dt="2018-03-21T06:33:23.367" v="1720" actId="478"/>
-          <ac:spMkLst>
-            <pc:docMk/>
-            <pc:sldMk cId="3720355804" sldId="263"/>
-            <ac:spMk id="8" creationId="{73CFDA79-4EFE-4C21-9297-EBB802F56EF3}"/>
-          </ac:spMkLst>
-        </pc:spChg>
-        <pc:spChg chg="add mod ord">
-          <ac:chgData name="Shabuddin Khan" userId="6572cdad-dc51-4cbc-b875-d48199489fd3" providerId="ADAL" clId="{FA00299C-1677-4761-8860-DECAFE39DA97}" dt="2018-03-21T06:42:39.588" v="1845" actId="1036"/>
-          <ac:spMkLst>
-            <pc:docMk/>
-            <pc:sldMk cId="3720355804" sldId="263"/>
-            <ac:spMk id="19" creationId="{9E263DD8-0E70-4887-8F2A-473E94280659}"/>
-          </ac:spMkLst>
-        </pc:spChg>
-        <pc:spChg chg="add mod">
-          <ac:chgData name="Shabuddin Khan" userId="6572cdad-dc51-4cbc-b875-d48199489fd3" providerId="ADAL" clId="{FA00299C-1677-4761-8860-DECAFE39DA97}" dt="2018-03-21T06:47:44.251" v="1975" actId="1076"/>
-          <ac:spMkLst>
-            <pc:docMk/>
-            <pc:sldMk cId="3720355804" sldId="263"/>
-            <ac:spMk id="22" creationId="{D6040024-A35D-477B-89D8-66C1B8539231}"/>
-          </ac:spMkLst>
-        </pc:spChg>
-        <pc:spChg chg="add del mod">
-          <ac:chgData name="Shabuddin Khan" userId="6572cdad-dc51-4cbc-b875-d48199489fd3" providerId="ADAL" clId="{FA00299C-1677-4761-8860-DECAFE39DA97}" dt="2018-03-21T06:21:37.265" v="1467" actId="478"/>
-          <ac:spMkLst>
-            <pc:docMk/>
-            <pc:sldMk cId="3720355804" sldId="263"/>
-            <ac:spMk id="24" creationId="{414ECBCA-2672-4E82-AE29-89665BACB3FF}"/>
-          </ac:spMkLst>
-        </pc:spChg>
-        <pc:spChg chg="add mod">
-          <ac:chgData name="Shabuddin Khan" userId="6572cdad-dc51-4cbc-b875-d48199489fd3" providerId="ADAL" clId="{FA00299C-1677-4761-8860-DECAFE39DA97}" dt="2018-03-21T06:56:24.604" v="2321" actId="20577"/>
-          <ac:spMkLst>
-            <pc:docMk/>
-            <pc:sldMk cId="3720355804" sldId="263"/>
-            <ac:spMk id="36" creationId="{FBADA058-2DB3-4252-87DB-975CDE17F281}"/>
-          </ac:spMkLst>
-        </pc:spChg>
-        <pc:spChg chg="add mod">
-          <ac:chgData name="Shabuddin Khan" userId="6572cdad-dc51-4cbc-b875-d48199489fd3" providerId="ADAL" clId="{FA00299C-1677-4761-8860-DECAFE39DA97}" dt="2018-03-21T06:52:50.954" v="2263" actId="1038"/>
-          <ac:spMkLst>
-            <pc:docMk/>
-            <pc:sldMk cId="3720355804" sldId="263"/>
-            <ac:spMk id="37" creationId="{34D51280-9ADD-4226-A983-4967AA06534C}"/>
-          </ac:spMkLst>
-        </pc:spChg>
-        <pc:spChg chg="add mod">
-          <ac:chgData name="Shabuddin Khan" userId="6572cdad-dc51-4cbc-b875-d48199489fd3" providerId="ADAL" clId="{FA00299C-1677-4761-8860-DECAFE39DA97}" dt="2018-03-21T06:48:25.295" v="2126" actId="1037"/>
-          <ac:spMkLst>
-            <pc:docMk/>
-            <pc:sldMk cId="3720355804" sldId="263"/>
-            <ac:spMk id="53" creationId="{23C046B3-12F2-4FEA-AC34-E9A29CBB42FB}"/>
-          </ac:spMkLst>
-        </pc:spChg>
-        <pc:spChg chg="add mod">
-          <ac:chgData name="Shabuddin Khan" userId="6572cdad-dc51-4cbc-b875-d48199489fd3" providerId="ADAL" clId="{FA00299C-1677-4761-8860-DECAFE39DA97}" dt="2018-03-21T06:52:23" v="2259" actId="122"/>
-          <ac:spMkLst>
-            <pc:docMk/>
-            <pc:sldMk cId="3720355804" sldId="263"/>
-            <ac:spMk id="55" creationId="{B7B81A51-C5E8-4D6A-8D8F-1E0CFC2E4F76}"/>
-          </ac:spMkLst>
-        </pc:spChg>
-        <pc:spChg chg="add mod">
-          <ac:chgData name="Shabuddin Khan" userId="6572cdad-dc51-4cbc-b875-d48199489fd3" providerId="ADAL" clId="{FA00299C-1677-4761-8860-DECAFE39DA97}" dt="2018-03-21T06:42:39.588" v="1845" actId="1036"/>
-          <ac:spMkLst>
-            <pc:docMk/>
-            <pc:sldMk cId="3720355804" sldId="263"/>
-            <ac:spMk id="56" creationId="{7289D867-8701-4CE3-BB3F-BE4814B75795}"/>
-          </ac:spMkLst>
-        </pc:spChg>
-        <pc:spChg chg="add mod ord">
-          <ac:chgData name="Shabuddin Khan" userId="6572cdad-dc51-4cbc-b875-d48199489fd3" providerId="ADAL" clId="{FA00299C-1677-4761-8860-DECAFE39DA97}" dt="2018-03-21T06:42:39.588" v="1845" actId="1036"/>
-          <ac:spMkLst>
-            <pc:docMk/>
-            <pc:sldMk cId="3720355804" sldId="263"/>
-            <ac:spMk id="61" creationId="{72CA8FAF-934C-48C3-94B3-0742E3BB4953}"/>
-          </ac:spMkLst>
-        </pc:spChg>
-        <pc:spChg chg="add mod">
-          <ac:chgData name="Shabuddin Khan" userId="6572cdad-dc51-4cbc-b875-d48199489fd3" providerId="ADAL" clId="{FA00299C-1677-4761-8860-DECAFE39DA97}" dt="2018-03-21T10:50:32.026" v="2375" actId="1076"/>
-          <ac:spMkLst>
-            <pc:docMk/>
-            <pc:sldMk cId="3720355804" sldId="263"/>
-            <ac:spMk id="67" creationId="{1BD5791C-F11B-44F4-A88B-DE14524EE9A2}"/>
-          </ac:spMkLst>
-        </pc:spChg>
-        <pc:spChg chg="add mod">
-          <ac:chgData name="Shabuddin Khan" userId="6572cdad-dc51-4cbc-b875-d48199489fd3" providerId="ADAL" clId="{FA00299C-1677-4761-8860-DECAFE39DA97}" dt="2018-03-21T06:48:17.439" v="2084" actId="1037"/>
-          <ac:spMkLst>
-            <pc:docMk/>
-            <pc:sldMk cId="3720355804" sldId="263"/>
-            <ac:spMk id="78" creationId="{E8944280-243E-489A-8DF2-319DFF8A8CE2}"/>
-          </ac:spMkLst>
-        </pc:spChg>
-        <pc:spChg chg="add mod ord">
-          <ac:chgData name="Shabuddin Khan" userId="6572cdad-dc51-4cbc-b875-d48199489fd3" providerId="ADAL" clId="{FA00299C-1677-4761-8860-DECAFE39DA97}" dt="2018-03-21T06:42:39.588" v="1845" actId="1036"/>
-          <ac:spMkLst>
-            <pc:docMk/>
-            <pc:sldMk cId="3720355804" sldId="263"/>
-            <ac:spMk id="85" creationId="{7D7D3F09-3293-4F40-A4A1-C005F41613CC}"/>
-          </ac:spMkLst>
-        </pc:spChg>
-        <pc:spChg chg="add del mod">
-          <ac:chgData name="Shabuddin Khan" userId="6572cdad-dc51-4cbc-b875-d48199489fd3" providerId="ADAL" clId="{FA00299C-1677-4761-8860-DECAFE39DA97}" dt="2018-03-19T09:31:55.712" v="928" actId="478"/>
-          <ac:spMkLst>
-            <pc:docMk/>
-            <pc:sldMk cId="3720355804" sldId="263"/>
-            <ac:spMk id="1036" creationId="{041BB5BB-FA8E-4162-BC9C-0D0658A11308}"/>
-          </ac:spMkLst>
-        </pc:spChg>
-        <pc:spChg chg="add mod">
-          <ac:chgData name="Shabuddin Khan" userId="6572cdad-dc51-4cbc-b875-d48199489fd3" providerId="ADAL" clId="{FA00299C-1677-4761-8860-DECAFE39DA97}" dt="2018-03-21T06:44:01.382" v="1914" actId="20577"/>
-          <ac:spMkLst>
-            <pc:docMk/>
-            <pc:sldMk cId="3720355804" sldId="263"/>
-            <ac:spMk id="1037" creationId="{B6EEB600-0DA3-4409-908E-AE231FA28EEA}"/>
-          </ac:spMkLst>
-        </pc:spChg>
-        <pc:spChg chg="add del mod">
-          <ac:chgData name="Shabuddin Khan" userId="6572cdad-dc51-4cbc-b875-d48199489fd3" providerId="ADAL" clId="{FA00299C-1677-4761-8860-DECAFE39DA97}" dt="2018-03-21T06:52:04.277" v="2258" actId="121"/>
-          <ac:spMkLst>
-            <pc:docMk/>
-            <pc:sldMk cId="3720355804" sldId="263"/>
-            <ac:spMk id="1040" creationId="{80A3B630-51C8-4B35-A7B3-B2095FC785FE}"/>
-          </ac:spMkLst>
-        </pc:spChg>
-        <pc:spChg chg="add del mod">
-          <ac:chgData name="Shabuddin Khan" userId="6572cdad-dc51-4cbc-b875-d48199489fd3" providerId="ADAL" clId="{FA00299C-1677-4761-8860-DECAFE39DA97}" dt="2018-03-21T06:51:50.603" v="2257" actId="20577"/>
-          <ac:spMkLst>
-            <pc:docMk/>
-            <pc:sldMk cId="3720355804" sldId="263"/>
-            <ac:spMk id="1041" creationId="{1A003C55-6349-493D-8D4F-B35E93D7E8CE}"/>
-          </ac:spMkLst>
-        </pc:spChg>
-        <pc:spChg chg="add mod">
-          <ac:chgData name="Shabuddin Khan" userId="6572cdad-dc51-4cbc-b875-d48199489fd3" providerId="ADAL" clId="{FA00299C-1677-4761-8860-DECAFE39DA97}" dt="2018-03-21T06:52:30.264" v="2260" actId="122"/>
-          <ac:spMkLst>
-            <pc:docMk/>
-            <pc:sldMk cId="3720355804" sldId="263"/>
-            <ac:spMk id="1042" creationId="{970FB498-91EE-4CB4-8806-11C1B0152079}"/>
-          </ac:spMkLst>
-        </pc:spChg>
-        <pc:picChg chg="add mod">
-          <ac:chgData name="Shabuddin Khan" userId="6572cdad-dc51-4cbc-b875-d48199489fd3" providerId="ADAL" clId="{FA00299C-1677-4761-8860-DECAFE39DA97}" dt="2018-03-21T06:56:38.112" v="2326" actId="1035"/>
-          <ac:picMkLst>
-            <pc:docMk/>
-            <pc:sldMk cId="3720355804" sldId="263"/>
-            <ac:picMk id="7" creationId="{412497F6-EDFD-4FE8-9653-C9401C81A965}"/>
-          </ac:picMkLst>
-        </pc:picChg>
-        <pc:picChg chg="add del mod">
-          <ac:chgData name="Shabuddin Khan" userId="6572cdad-dc51-4cbc-b875-d48199489fd3" providerId="ADAL" clId="{FA00299C-1677-4761-8860-DECAFE39DA97}" dt="2018-03-19T07:26:40.023" v="171" actId="122"/>
-          <ac:picMkLst>
-            <pc:docMk/>
-            <pc:sldMk cId="3720355804" sldId="263"/>
-            <ac:picMk id="10" creationId="{F3B01A79-8198-49DA-8C4D-0C069A69F92B}"/>
-          </ac:picMkLst>
-        </pc:picChg>
-        <pc:picChg chg="add del mod">
-          <ac:chgData name="Shabuddin Khan" userId="6572cdad-dc51-4cbc-b875-d48199489fd3" providerId="ADAL" clId="{FA00299C-1677-4761-8860-DECAFE39DA97}" dt="2018-03-19T07:26:37.796" v="167" actId="122"/>
-          <ac:picMkLst>
-            <pc:docMk/>
-            <pc:sldMk cId="3720355804" sldId="263"/>
-            <ac:picMk id="12" creationId="{80F67680-7D54-4459-8D29-A0569638B849}"/>
-          </ac:picMkLst>
-        </pc:picChg>
-        <pc:picChg chg="add del mod">
-          <ac:chgData name="Shabuddin Khan" userId="6572cdad-dc51-4cbc-b875-d48199489fd3" providerId="ADAL" clId="{FA00299C-1677-4761-8860-DECAFE39DA97}" dt="2018-03-19T07:43:41.326" v="552" actId="478"/>
-          <ac:picMkLst>
-            <pc:docMk/>
-            <pc:sldMk cId="3720355804" sldId="263"/>
-            <ac:picMk id="14" creationId="{F69575F4-7DF7-488C-855C-1C9CF3B1ED8A}"/>
-          </ac:picMkLst>
-        </pc:picChg>
-        <pc:picChg chg="add del mod">
-          <ac:chgData name="Shabuddin Khan" userId="6572cdad-dc51-4cbc-b875-d48199489fd3" providerId="ADAL" clId="{FA00299C-1677-4761-8860-DECAFE39DA97}" dt="2018-03-21T06:42:39.588" v="1845" actId="1036"/>
-          <ac:picMkLst>
-            <pc:docMk/>
-            <pc:sldMk cId="3720355804" sldId="263"/>
-            <ac:picMk id="16" creationId="{791204A8-AEB0-4DAA-855F-92882FD58FD5}"/>
-          </ac:picMkLst>
-        </pc:picChg>
-        <pc:picChg chg="add del mod">
-          <ac:chgData name="Shabuddin Khan" userId="6572cdad-dc51-4cbc-b875-d48199489fd3" providerId="ADAL" clId="{FA00299C-1677-4761-8860-DECAFE39DA97}" dt="2018-03-21T06:33:41.151" v="1723" actId="478"/>
-          <ac:picMkLst>
-            <pc:docMk/>
-            <pc:sldMk cId="3720355804" sldId="263"/>
-            <ac:picMk id="18" creationId="{40C997B4-315C-4686-A4D5-B254AC39F8E0}"/>
-          </ac:picMkLst>
-        </pc:picChg>
-        <pc:picChg chg="add mod">
-          <ac:chgData name="Shabuddin Khan" userId="6572cdad-dc51-4cbc-b875-d48199489fd3" providerId="ADAL" clId="{FA00299C-1677-4761-8860-DECAFE39DA97}" dt="2018-03-21T10:05:02.199" v="2348" actId="1076"/>
-          <ac:picMkLst>
-            <pc:docMk/>
-            <pc:sldMk cId="3720355804" sldId="263"/>
-            <ac:picMk id="21" creationId="{F8F01813-247A-44A4-999E-83BAF8B1ACD7}"/>
-          </ac:picMkLst>
-        </pc:picChg>
-        <pc:picChg chg="add mod">
-          <ac:chgData name="Shabuddin Khan" userId="6572cdad-dc51-4cbc-b875-d48199489fd3" providerId="ADAL" clId="{FA00299C-1677-4761-8860-DECAFE39DA97}" dt="2018-03-21T06:42:39.588" v="1845" actId="1036"/>
-          <ac:picMkLst>
-            <pc:docMk/>
-            <pc:sldMk cId="3720355804" sldId="263"/>
-            <ac:picMk id="23" creationId="{DF22F11E-1090-4F39-BBC0-52988581321B}"/>
-          </ac:picMkLst>
-        </pc:picChg>
-        <pc:picChg chg="add mod">
-          <ac:chgData name="Shabuddin Khan" userId="6572cdad-dc51-4cbc-b875-d48199489fd3" providerId="ADAL" clId="{FA00299C-1677-4761-8860-DECAFE39DA97}" dt="2018-03-21T06:48:10.249" v="2043" actId="1038"/>
-          <ac:picMkLst>
-            <pc:docMk/>
-            <pc:sldMk cId="3720355804" sldId="263"/>
-            <ac:picMk id="25" creationId="{EE67E757-5B1F-48BC-B3D9-E7BB147A1912}"/>
-          </ac:picMkLst>
-        </pc:picChg>
-        <pc:picChg chg="add del mod">
-          <ac:chgData name="Shabuddin Khan" userId="6572cdad-dc51-4cbc-b875-d48199489fd3" providerId="ADAL" clId="{FA00299C-1677-4761-8860-DECAFE39DA97}" dt="2018-03-21T06:47:28.372" v="1973" actId="478"/>
-          <ac:picMkLst>
-            <pc:docMk/>
-            <pc:sldMk cId="3720355804" sldId="263"/>
-            <ac:picMk id="26" creationId="{8067A2E8-CF5B-4443-9718-C0D50E71CAF1}"/>
-          </ac:picMkLst>
-        </pc:picChg>
-        <pc:picChg chg="add del mod">
-          <ac:chgData name="Shabuddin Khan" userId="6572cdad-dc51-4cbc-b875-d48199489fd3" providerId="ADAL" clId="{FA00299C-1677-4761-8860-DECAFE39DA97}" dt="2018-03-21T06:42:39.588" v="1845" actId="1036"/>
-          <ac:picMkLst>
-            <pc:docMk/>
-            <pc:sldMk cId="3720355804" sldId="263"/>
-            <ac:picMk id="27" creationId="{8A57CA20-53A0-4228-BDBA-EE9DBC7A0A58}"/>
-          </ac:picMkLst>
-        </pc:picChg>
-        <pc:picChg chg="add del mod">
-          <ac:chgData name="Shabuddin Khan" userId="6572cdad-dc51-4cbc-b875-d48199489fd3" providerId="ADAL" clId="{FA00299C-1677-4761-8860-DECAFE39DA97}" dt="2018-03-19T07:33:09.025" v="382" actId="478"/>
-          <ac:picMkLst>
-            <pc:docMk/>
-            <pc:sldMk cId="3720355804" sldId="263"/>
-            <ac:picMk id="28" creationId="{8862B748-1512-4D31-B225-67B5EA660A87}"/>
-          </ac:picMkLst>
-        </pc:picChg>
-        <pc:picChg chg="add del mod">
-          <ac:chgData name="Shabuddin Khan" userId="6572cdad-dc51-4cbc-b875-d48199489fd3" providerId="ADAL" clId="{FA00299C-1677-4761-8860-DECAFE39DA97}" dt="2018-03-21T06:33:41.151" v="1723" actId="478"/>
-          <ac:picMkLst>
-            <pc:docMk/>
-            <pc:sldMk cId="3720355804" sldId="263"/>
-            <ac:picMk id="30" creationId="{D3AFEC2E-0E7D-47DD-8023-81C708FC5C69}"/>
-          </ac:picMkLst>
-        </pc:picChg>
-        <pc:picChg chg="add del mod">
-          <ac:chgData name="Shabuddin Khan" userId="6572cdad-dc51-4cbc-b875-d48199489fd3" providerId="ADAL" clId="{FA00299C-1677-4761-8860-DECAFE39DA97}" dt="2018-03-19T09:29:22.296" v="913" actId="122"/>
-          <ac:picMkLst>
-            <pc:docMk/>
-            <pc:sldMk cId="3720355804" sldId="263"/>
-            <ac:picMk id="32" creationId="{DEB0B7A2-8128-4965-A4BF-CA809CACACC8}"/>
-          </ac:picMkLst>
-        </pc:picChg>
-        <pc:picChg chg="add del mod">
-          <ac:chgData name="Shabuddin Khan" userId="6572cdad-dc51-4cbc-b875-d48199489fd3" providerId="ADAL" clId="{FA00299C-1677-4761-8860-DECAFE39DA97}" dt="2018-03-19T09:31:45.199" v="926" actId="122"/>
-          <ac:picMkLst>
-            <pc:docMk/>
-            <pc:sldMk cId="3720355804" sldId="263"/>
-            <ac:picMk id="34" creationId="{9B252173-3B17-41DD-957E-CDDF9346A9EB}"/>
-          </ac:picMkLst>
-        </pc:picChg>
-        <pc:picChg chg="add del mod">
-          <ac:chgData name="Shabuddin Khan" userId="6572cdad-dc51-4cbc-b875-d48199489fd3" providerId="ADAL" clId="{FA00299C-1677-4761-8860-DECAFE39DA97}" dt="2018-03-21T06:42:39.588" v="1845" actId="1036"/>
-          <ac:picMkLst>
-            <pc:docMk/>
-            <pc:sldMk cId="3720355804" sldId="263"/>
-            <ac:picMk id="35" creationId="{337D3AA2-28F0-4A58-9C0C-C817AFC037F8}"/>
-          </ac:picMkLst>
-        </pc:picChg>
-        <pc:picChg chg="add del">
-          <ac:chgData name="Shabuddin Khan" userId="6572cdad-dc51-4cbc-b875-d48199489fd3" providerId="ADAL" clId="{FA00299C-1677-4761-8860-DECAFE39DA97}" dt="2018-03-19T09:31:43.805" v="923" actId="122"/>
-          <ac:picMkLst>
-            <pc:docMk/>
-            <pc:sldMk cId="3720355804" sldId="263"/>
-            <ac:picMk id="36" creationId="{91D8A1E5-57C6-4FBA-A098-196D5ABE56E6}"/>
-          </ac:picMkLst>
-        </pc:picChg>
-        <pc:picChg chg="add del mod">
-          <ac:chgData name="Shabuddin Khan" userId="6572cdad-dc51-4cbc-b875-d48199489fd3" providerId="ADAL" clId="{FA00299C-1677-4761-8860-DECAFE39DA97}" dt="2018-03-21T06:41:15.758" v="1781" actId="122"/>
-          <ac:picMkLst>
-            <pc:docMk/>
-            <pc:sldMk cId="3720355804" sldId="263"/>
-            <ac:picMk id="38" creationId="{116344E1-DC91-4CF5-A229-8DF0E3F9E9A7}"/>
-          </ac:picMkLst>
-        </pc:picChg>
-        <pc:picChg chg="add mod">
-          <ac:chgData name="Shabuddin Khan" userId="6572cdad-dc51-4cbc-b875-d48199489fd3" providerId="ADAL" clId="{FA00299C-1677-4761-8860-DECAFE39DA97}" dt="2018-03-21T06:46:15.216" v="1947" actId="14100"/>
-          <ac:picMkLst>
-            <pc:docMk/>
-            <pc:sldMk cId="3720355804" sldId="263"/>
-            <ac:picMk id="40" creationId="{ADD8E3C9-8035-4C50-A700-1F03DB4C6B4C}"/>
-          </ac:picMkLst>
-        </pc:picChg>
-        <pc:picChg chg="add del mod">
-          <ac:chgData name="Shabuddin Khan" userId="6572cdad-dc51-4cbc-b875-d48199489fd3" providerId="ADAL" clId="{FA00299C-1677-4761-8860-DECAFE39DA97}" dt="2018-03-19T09:21:57.857" v="841" actId="478"/>
-          <ac:picMkLst>
-            <pc:docMk/>
-            <pc:sldMk cId="3720355804" sldId="263"/>
-            <ac:picMk id="40" creationId="{226BBE02-AEDC-47F1-AE1B-B3384E01A374}"/>
-          </ac:picMkLst>
-        </pc:picChg>
-        <pc:picChg chg="add del">
-          <ac:chgData name="Shabuddin Khan" userId="6572cdad-dc51-4cbc-b875-d48199489fd3" providerId="ADAL" clId="{FA00299C-1677-4761-8860-DECAFE39DA97}" dt="2018-03-19T07:37:28.471" v="471" actId="122"/>
-          <ac:picMkLst>
-            <pc:docMk/>
-            <pc:sldMk cId="3720355804" sldId="263"/>
-            <ac:picMk id="41" creationId="{4C51217C-0ADD-4B58-A75E-999B75043C7D}"/>
-          </ac:picMkLst>
-        </pc:picChg>
-        <pc:picChg chg="add del mod">
-          <ac:chgData name="Shabuddin Khan" userId="6572cdad-dc51-4cbc-b875-d48199489fd3" providerId="ADAL" clId="{FA00299C-1677-4761-8860-DECAFE39DA97}" dt="2018-03-19T09:36:51.059" v="1011" actId="478"/>
-          <ac:picMkLst>
-            <pc:docMk/>
-            <pc:sldMk cId="3720355804" sldId="263"/>
-            <ac:picMk id="43" creationId="{51E6A767-46B4-4596-ACE6-06C3FA1F6CD2}"/>
-          </ac:picMkLst>
-        </pc:picChg>
-        <pc:picChg chg="add del mod">
-          <ac:chgData name="Shabuddin Khan" userId="6572cdad-dc51-4cbc-b875-d48199489fd3" providerId="ADAL" clId="{FA00299C-1677-4761-8860-DECAFE39DA97}" dt="2018-03-19T09:37:45.284" v="1017" actId="478"/>
-          <ac:picMkLst>
-            <pc:docMk/>
-            <pc:sldMk cId="3720355804" sldId="263"/>
-            <ac:picMk id="44" creationId="{ADF10086-8621-4A59-B2DA-9D5418F84B9D}"/>
-          </ac:picMkLst>
-        </pc:picChg>
-        <pc:picChg chg="add mod">
-          <ac:chgData name="Shabuddin Khan" userId="6572cdad-dc51-4cbc-b875-d48199489fd3" providerId="ADAL" clId="{FA00299C-1677-4761-8860-DECAFE39DA97}" dt="2018-03-21T06:42:39.588" v="1845" actId="1036"/>
-          <ac:picMkLst>
-            <pc:docMk/>
-            <pc:sldMk cId="3720355804" sldId="263"/>
-            <ac:picMk id="45" creationId="{770DBA86-D0E1-46E0-B9C8-F75BA91C7F3B}"/>
-          </ac:picMkLst>
-        </pc:picChg>
-        <pc:picChg chg="add mod">
-          <ac:chgData name="Shabuddin Khan" userId="6572cdad-dc51-4cbc-b875-d48199489fd3" providerId="ADAL" clId="{FA00299C-1677-4761-8860-DECAFE39DA97}" dt="2018-03-21T06:42:39.588" v="1845" actId="1036"/>
-          <ac:picMkLst>
-            <pc:docMk/>
-            <pc:sldMk cId="3720355804" sldId="263"/>
-            <ac:picMk id="52" creationId="{7DDBF1F4-93F5-4371-ACA0-7DB3247746F0}"/>
-          </ac:picMkLst>
-        </pc:picChg>
-        <pc:picChg chg="add mod">
-          <ac:chgData name="Shabuddin Khan" userId="6572cdad-dc51-4cbc-b875-d48199489fd3" providerId="ADAL" clId="{FA00299C-1677-4761-8860-DECAFE39DA97}" dt="2018-03-21T06:42:39.588" v="1845" actId="1036"/>
-          <ac:picMkLst>
-            <pc:docMk/>
-            <pc:sldMk cId="3720355804" sldId="263"/>
-            <ac:picMk id="54" creationId="{BF307567-CAAE-419C-BA20-6DDBB348B306}"/>
-          </ac:picMkLst>
-        </pc:picChg>
-        <pc:picChg chg="add del mod">
-          <ac:chgData name="Shabuddin Khan" userId="6572cdad-dc51-4cbc-b875-d48199489fd3" providerId="ADAL" clId="{FA00299C-1677-4761-8860-DECAFE39DA97}" dt="2018-03-19T09:24:36.006" v="848" actId="478"/>
-          <ac:picMkLst>
-            <pc:docMk/>
-            <pc:sldMk cId="3720355804" sldId="263"/>
-            <ac:picMk id="56" creationId="{2AAFD7BC-FCCD-4210-8DD8-A45A3606FCD1}"/>
-          </ac:picMkLst>
-        </pc:picChg>
-        <pc:picChg chg="add mod">
-          <ac:chgData name="Shabuddin Khan" userId="6572cdad-dc51-4cbc-b875-d48199489fd3" providerId="ADAL" clId="{FA00299C-1677-4761-8860-DECAFE39DA97}" dt="2018-03-21T06:44:53.380" v="1923" actId="1076"/>
-          <ac:picMkLst>
-            <pc:docMk/>
-            <pc:sldMk cId="3720355804" sldId="263"/>
-            <ac:picMk id="62" creationId="{8AF1D278-FA45-46EF-A604-5E42B77D082E}"/>
-          </ac:picMkLst>
-        </pc:picChg>
-        <pc:picChg chg="add del mod">
-          <ac:chgData name="Shabuddin Khan" userId="6572cdad-dc51-4cbc-b875-d48199489fd3" providerId="ADAL" clId="{FA00299C-1677-4761-8860-DECAFE39DA97}" dt="2018-03-19T09:24:53.207" v="855" actId="478"/>
-          <ac:picMkLst>
-            <pc:docMk/>
-            <pc:sldMk cId="3720355804" sldId="263"/>
-            <ac:picMk id="63" creationId="{710E5100-7995-488D-BB3B-C95DE2F20117}"/>
-          </ac:picMkLst>
-        </pc:picChg>
-        <pc:picChg chg="add mod">
-          <ac:chgData name="Shabuddin Khan" userId="6572cdad-dc51-4cbc-b875-d48199489fd3" providerId="ADAL" clId="{FA00299C-1677-4761-8860-DECAFE39DA97}" dt="2018-03-21T06:55:04.296" v="2275" actId="1076"/>
-          <ac:picMkLst>
-            <pc:docMk/>
-            <pc:sldMk cId="3720355804" sldId="263"/>
-            <ac:picMk id="66" creationId="{3C3AA10A-E028-4A43-9144-28202BCCE986}"/>
-          </ac:picMkLst>
-        </pc:picChg>
-        <pc:picChg chg="add mod">
-          <ac:chgData name="Shabuddin Khan" userId="6572cdad-dc51-4cbc-b875-d48199489fd3" providerId="ADAL" clId="{FA00299C-1677-4761-8860-DECAFE39DA97}" dt="2018-03-21T06:55:13.999" v="2278" actId="1036"/>
-          <ac:picMkLst>
-            <pc:docMk/>
-            <pc:sldMk cId="3720355804" sldId="263"/>
-            <ac:picMk id="1026" creationId="{BF9AB754-2EDE-4BDE-9592-D43702A5C6B2}"/>
-          </ac:picMkLst>
-        </pc:picChg>
-        <pc:picChg chg="add del mod">
-          <ac:chgData name="Shabuddin Khan" userId="6572cdad-dc51-4cbc-b875-d48199489fd3" providerId="ADAL" clId="{FA00299C-1677-4761-8860-DECAFE39DA97}" dt="2018-03-19T09:15:48.842" v="663" actId="478"/>
-          <ac:picMkLst>
-            <pc:docMk/>
-            <pc:sldMk cId="3720355804" sldId="263"/>
-            <ac:picMk id="1026" creationId="{52B52617-ED15-476F-8F7D-494DA9708099}"/>
-          </ac:picMkLst>
-        </pc:picChg>
-        <pc:picChg chg="add del mod">
-          <ac:chgData name="Shabuddin Khan" userId="6572cdad-dc51-4cbc-b875-d48199489fd3" providerId="ADAL" clId="{FA00299C-1677-4761-8860-DECAFE39DA97}" dt="2018-03-19T07:39:46.744" v="501" actId="478"/>
-          <ac:picMkLst>
-            <pc:docMk/>
-            <pc:sldMk cId="3720355804" sldId="263"/>
-            <ac:picMk id="1035" creationId="{8D66EE48-8594-43E9-9262-06614532A1D6}"/>
-          </ac:picMkLst>
-        </pc:picChg>
-        <pc:picChg chg="add mod">
-          <ac:chgData name="Shabuddin Khan" userId="6572cdad-dc51-4cbc-b875-d48199489fd3" providerId="ADAL" clId="{FA00299C-1677-4761-8860-DECAFE39DA97}" dt="2018-03-21T06:44:21.885" v="1915" actId="1076"/>
-          <ac:picMkLst>
-            <pc:docMk/>
-            <pc:sldMk cId="3720355804" sldId="263"/>
-            <ac:picMk id="1051" creationId="{BFE54276-6366-417E-81C5-DB98DB8AC750}"/>
-          </ac:picMkLst>
-        </pc:picChg>
-        <pc:picChg chg="add mod">
-          <ac:chgData name="Shabuddin Khan" userId="6572cdad-dc51-4cbc-b875-d48199489fd3" providerId="ADAL" clId="{FA00299C-1677-4761-8860-DECAFE39DA97}" dt="2018-03-21T06:48:10.249" v="2043" actId="1038"/>
-          <ac:picMkLst>
-            <pc:docMk/>
-            <pc:sldMk cId="3720355804" sldId="263"/>
-            <ac:picMk id="1052" creationId="{C7731B0A-4780-46A9-A31F-B9C283E2B44E}"/>
-          </ac:picMkLst>
-        </pc:picChg>
-        <pc:cxnChg chg="add mod">
-          <ac:chgData name="Shabuddin Khan" userId="6572cdad-dc51-4cbc-b875-d48199489fd3" providerId="ADAL" clId="{FA00299C-1677-4761-8860-DECAFE39DA97}" dt="2018-03-21T06:44:21.885" v="1915" actId="1076"/>
-          <ac:cxnSpMkLst>
-            <pc:docMk/>
-            <pc:sldMk cId="3720355804" sldId="263"/>
-            <ac:cxnSpMk id="1024" creationId="{96290A1F-2F7A-412E-8D53-9AE50B2E6854}"/>
-          </ac:cxnSpMkLst>
-        </pc:cxnChg>
-        <pc:cxnChg chg="add del mod">
-          <ac:chgData name="Shabuddin Khan" userId="6572cdad-dc51-4cbc-b875-d48199489fd3" providerId="ADAL" clId="{FA00299C-1677-4761-8860-DECAFE39DA97}" dt="2018-03-21T06:49:14.454" v="2168" actId="208"/>
-          <ac:cxnSpMkLst>
-            <pc:docMk/>
-            <pc:sldMk cId="3720355804" sldId="263"/>
-            <ac:cxnSpMk id="1028" creationId="{C81721D3-82FC-4519-B8C9-6B62DD564AC0}"/>
-          </ac:cxnSpMkLst>
-        </pc:cxnChg>
-        <pc:cxnChg chg="add del mod">
-          <ac:chgData name="Shabuddin Khan" userId="6572cdad-dc51-4cbc-b875-d48199489fd3" providerId="ADAL" clId="{FA00299C-1677-4761-8860-DECAFE39DA97}" dt="2018-03-21T06:50:22.437" v="2226" actId="1037"/>
-          <ac:cxnSpMkLst>
-            <pc:docMk/>
-            <pc:sldMk cId="3720355804" sldId="263"/>
-            <ac:cxnSpMk id="1030" creationId="{EF93EE49-32A4-4E73-8DDB-D6C64EBC445F}"/>
-          </ac:cxnSpMkLst>
-        </pc:cxnChg>
-        <pc:cxnChg chg="add mod">
-          <ac:chgData name="Shabuddin Khan" userId="6572cdad-dc51-4cbc-b875-d48199489fd3" providerId="ADAL" clId="{FA00299C-1677-4761-8860-DECAFE39DA97}" dt="2018-03-21T06:48:10.249" v="2043" actId="1038"/>
-          <ac:cxnSpMkLst>
-            <pc:docMk/>
-            <pc:sldMk cId="3720355804" sldId="263"/>
-            <ac:cxnSpMk id="1032" creationId="{9C33136D-3B43-416A-8C96-335ABAFDB659}"/>
-          </ac:cxnSpMkLst>
-        </pc:cxnChg>
-      </pc:sldChg>
-      <pc:sldChg chg="addSp delSp modSp add">
-        <pc:chgData name="Shabuddin Khan" userId="6572cdad-dc51-4cbc-b875-d48199489fd3" providerId="ADAL" clId="{FA00299C-1677-4761-8860-DECAFE39DA97}" dt="2018-03-21T16:50:34.334" v="2517" actId="122"/>
-        <pc:sldMkLst>
-          <pc:docMk/>
-          <pc:sldMk cId="1305520245" sldId="264"/>
-        </pc:sldMkLst>
-        <pc:spChg chg="mod">
-          <ac:chgData name="Shabuddin Khan" userId="6572cdad-dc51-4cbc-b875-d48199489fd3" providerId="ADAL" clId="{FA00299C-1677-4761-8860-DECAFE39DA97}" dt="2018-03-21T16:49:45.568" v="2507" actId="27636"/>
-          <ac:spMkLst>
-            <pc:docMk/>
-            <pc:sldMk cId="1305520245" sldId="264"/>
-            <ac:spMk id="2" creationId="{8782ED5D-44B1-40D8-AF4C-E4EADF920B32}"/>
-          </ac:spMkLst>
-        </pc:spChg>
-        <pc:spChg chg="del">
-          <ac:chgData name="Shabuddin Khan" userId="6572cdad-dc51-4cbc-b875-d48199489fd3" providerId="ADAL" clId="{FA00299C-1677-4761-8860-DECAFE39DA97}" dt="2018-03-21T04:57:23.705" v="1155" actId="478"/>
-          <ac:spMkLst>
-            <pc:docMk/>
-            <pc:sldMk cId="1305520245" sldId="264"/>
-            <ac:spMk id="3" creationId="{F41B8C60-7257-4137-8610-8638CD4A5EAC}"/>
-          </ac:spMkLst>
-        </pc:spChg>
-        <pc:graphicFrameChg chg="add mod modGraphic">
-          <ac:chgData name="Shabuddin Khan" userId="6572cdad-dc51-4cbc-b875-d48199489fd3" providerId="ADAL" clId="{FA00299C-1677-4761-8860-DECAFE39DA97}" dt="2018-03-21T16:50:34.334" v="2517" actId="122"/>
-          <ac:graphicFrameMkLst>
-            <pc:docMk/>
-            <pc:sldMk cId="1305520245" sldId="264"/>
-            <ac:graphicFrameMk id="4" creationId="{13546BF2-330C-483D-9AF1-98A668163D1B}"/>
-          </ac:graphicFrameMkLst>
-        </pc:graphicFrameChg>
-      </pc:sldChg>
-    </pc:docChg>
-  </pc:docChgLst>
-  <pc:docChgLst>
-    <pc:chgData name="Shabuddin Khan" userId="6572cdad-dc51-4cbc-b875-d48199489fd3" providerId="ADAL" clId="{5566B4E7-385E-4760-AE0C-7D95B133E340}"/>
-    <pc:docChg chg="modSld">
-      <pc:chgData name="Shabuddin Khan" userId="6572cdad-dc51-4cbc-b875-d48199489fd3" providerId="ADAL" clId="{5566B4E7-385E-4760-AE0C-7D95B133E340}" dt="2018-04-16T14:17:22.446" v="7" actId="20577"/>
-      <pc:docMkLst>
-        <pc:docMk/>
-      </pc:docMkLst>
-      <pc:sldChg chg="modSp">
-        <pc:chgData name="Shabuddin Khan" userId="6572cdad-dc51-4cbc-b875-d48199489fd3" providerId="ADAL" clId="{5566B4E7-385E-4760-AE0C-7D95B133E340}" dt="2018-04-16T14:17:22.446" v="7" actId="20577"/>
-        <pc:sldMkLst>
-          <pc:docMk/>
-          <pc:sldMk cId="892997672" sldId="270"/>
-        </pc:sldMkLst>
-        <pc:spChg chg="mod">
-          <ac:chgData name="Shabuddin Khan" userId="6572cdad-dc51-4cbc-b875-d48199489fd3" providerId="ADAL" clId="{5566B4E7-385E-4760-AE0C-7D95B133E340}" dt="2018-04-16T14:17:22.446" v="7" actId="20577"/>
-          <ac:spMkLst>
-            <pc:docMk/>
-            <pc:sldMk cId="892997672" sldId="270"/>
-            <ac:spMk id="78" creationId="{E8944280-243E-489A-8DF2-319DFF8A8CE2}"/>
-          </ac:spMkLst>
-        </pc:spChg>
-      </pc:sldChg>
-    </pc:docChg>
-  </pc:docChgLst>
-</pc:chgInfo>
 </file>
 
 <file path=ppt/diagrams/colors1.xml><?xml version="1.0" encoding="utf-8"?>
@@ -8513,7 +7949,7 @@
           <a:p>
             <a:fld id="{53C998D3-C819-412A-870D-D0AAEB5CD01C}" type="datetimeFigureOut">
               <a:rPr lang="en-US" smtClean="0"/>
-              <a:t>4/16/2018</a:t>
+              <a:t>4/19/2018</a:t>
             </a:fld>
             <a:endParaRPr lang="en-US"/>
           </a:p>
@@ -8711,7 +8147,7 @@
           <a:p>
             <a:fld id="{53C998D3-C819-412A-870D-D0AAEB5CD01C}" type="datetimeFigureOut">
               <a:rPr lang="en-US" smtClean="0"/>
-              <a:t>4/16/2018</a:t>
+              <a:t>4/19/2018</a:t>
             </a:fld>
             <a:endParaRPr lang="en-US"/>
           </a:p>
@@ -8919,7 +8355,7 @@
           <a:p>
             <a:fld id="{53C998D3-C819-412A-870D-D0AAEB5CD01C}" type="datetimeFigureOut">
               <a:rPr lang="en-US" smtClean="0"/>
-              <a:t>4/16/2018</a:t>
+              <a:t>4/19/2018</a:t>
             </a:fld>
             <a:endParaRPr lang="en-US"/>
           </a:p>
@@ -9127,7 +8563,7 @@
           <a:p>
             <a:fld id="{53C998D3-C819-412A-870D-D0AAEB5CD01C}" type="datetimeFigureOut">
               <a:rPr lang="en-US" smtClean="0"/>
-              <a:t>4/16/2018</a:t>
+              <a:t>4/19/2018</a:t>
             </a:fld>
             <a:endParaRPr lang="en-US"/>
           </a:p>
@@ -9402,7 +8838,7 @@
           <a:p>
             <a:fld id="{53C998D3-C819-412A-870D-D0AAEB5CD01C}" type="datetimeFigureOut">
               <a:rPr lang="en-US" smtClean="0"/>
-              <a:t>4/16/2018</a:t>
+              <a:t>4/19/2018</a:t>
             </a:fld>
             <a:endParaRPr lang="en-US"/>
           </a:p>
@@ -9667,7 +9103,7 @@
           <a:p>
             <a:fld id="{53C998D3-C819-412A-870D-D0AAEB5CD01C}" type="datetimeFigureOut">
               <a:rPr lang="en-US" smtClean="0"/>
-              <a:t>4/16/2018</a:t>
+              <a:t>4/19/2018</a:t>
             </a:fld>
             <a:endParaRPr lang="en-US"/>
           </a:p>
@@ -10079,7 +9515,7 @@
           <a:p>
             <a:fld id="{53C998D3-C819-412A-870D-D0AAEB5CD01C}" type="datetimeFigureOut">
               <a:rPr lang="en-US" smtClean="0"/>
-              <a:t>4/16/2018</a:t>
+              <a:t>4/19/2018</a:t>
             </a:fld>
             <a:endParaRPr lang="en-US"/>
           </a:p>
@@ -10227,7 +9663,7 @@
           <a:p>
             <a:fld id="{53C998D3-C819-412A-870D-D0AAEB5CD01C}" type="datetimeFigureOut">
               <a:rPr lang="en-US" smtClean="0"/>
-              <a:t>4/16/2018</a:t>
+              <a:t>4/19/2018</a:t>
             </a:fld>
             <a:endParaRPr lang="en-US"/>
           </a:p>
@@ -10386,7 +9822,7 @@
           <a:p>
             <a:fld id="{53C998D3-C819-412A-870D-D0AAEB5CD01C}" type="datetimeFigureOut">
               <a:rPr lang="en-US" smtClean="0"/>
-              <a:t>4/16/2018</a:t>
+              <a:t>4/19/2018</a:t>
             </a:fld>
             <a:endParaRPr lang="en-US"/>
           </a:p>
@@ -10697,7 +10133,7 @@
           <a:p>
             <a:fld id="{53C998D3-C819-412A-870D-D0AAEB5CD01C}" type="datetimeFigureOut">
               <a:rPr lang="en-US" smtClean="0"/>
-              <a:t>4/16/2018</a:t>
+              <a:t>4/19/2018</a:t>
             </a:fld>
             <a:endParaRPr lang="en-US"/>
           </a:p>
@@ -10988,7 +10424,7 @@
           <a:p>
             <a:fld id="{53C998D3-C819-412A-870D-D0AAEB5CD01C}" type="datetimeFigureOut">
               <a:rPr lang="en-US" smtClean="0"/>
-              <a:t>4/16/2018</a:t>
+              <a:t>4/19/2018</a:t>
             </a:fld>
             <a:endParaRPr lang="en-US"/>
           </a:p>
@@ -11238,7 +10674,7 @@
           <a:p>
             <a:fld id="{53C998D3-C819-412A-870D-D0AAEB5CD01C}" type="datetimeFigureOut">
               <a:rPr lang="en-US" smtClean="0"/>
-              <a:t>4/16/2018</a:t>
+              <a:t>4/19/2018</a:t>
             </a:fld>
             <a:endParaRPr lang="en-US"/>
           </a:p>
@@ -18370,7 +17806,7 @@
                   <a:srgbClr val="FF0000"/>
                 </a:solidFill>
               </a:rPr>
-              <a:t>DPS : Basic</a:t>
+              <a:t>With- out DPS</a:t>
             </a:r>
           </a:p>
         </p:txBody>
@@ -18409,7 +17845,7 @@
                   <a:schemeClr val="accent6"/>
                 </a:solidFill>
               </a:rPr>
-              <a:t>DPS : Standard</a:t>
+              <a:t>With DPS</a:t>
             </a:r>
           </a:p>
         </p:txBody>
@@ -33512,18 +32948,18 @@
 </file>
 
 <file path=customXml/item2.xml><?xml version="1.0" encoding="utf-8"?>
+<p:properties xmlns:p="http://schemas.microsoft.com/office/2006/metadata/properties" xmlns:xsi="http://www.w3.org/2001/XMLSchema-instance" xmlns:pc="http://schemas.microsoft.com/office/infopath/2007/PartnerControls">
+  <documentManagement/>
+</p:properties>
+</file>
+
+<file path=customXml/item3.xml><?xml version="1.0" encoding="utf-8"?>
 <?mso-contentType ?>
 <FormTemplates xmlns="http://schemas.microsoft.com/sharepoint/v3/contenttype/forms">
   <Display>DocumentLibraryForm</Display>
   <Edit>DocumentLibraryForm</Edit>
   <New>DocumentLibraryForm</New>
 </FormTemplates>
-</file>
-
-<file path=customXml/item3.xml><?xml version="1.0" encoding="utf-8"?>
-<p:properties xmlns:p="http://schemas.microsoft.com/office/2006/metadata/properties" xmlns:xsi="http://www.w3.org/2001/XMLSchema-instance" xmlns:pc="http://schemas.microsoft.com/office/infopath/2007/PartnerControls">
-  <documentManagement/>
-</p:properties>
 </file>
 
 <file path=customXml/itemProps1.xml><?xml version="1.0" encoding="utf-8"?>
@@ -33546,26 +32982,26 @@
 </file>
 
 <file path=customXml/itemProps2.xml><?xml version="1.0" encoding="utf-8"?>
+<ds:datastoreItem xmlns:ds="http://schemas.openxmlformats.org/officeDocument/2006/customXml" ds:itemID="{2BC4359B-39BF-4631-A3A8-18D4D323FA7C}">
+  <ds:schemaRefs>
+    <ds:schemaRef ds:uri="http://schemas.microsoft.com/office/2006/metadata/properties"/>
+    <ds:schemaRef ds:uri="625b0429-57c0-41ed-b4b9-cb84fb06689a"/>
+    <ds:schemaRef ds:uri="0a1749d7-1680-4b4c-ac1a-b66627f7b711"/>
+    <ds:schemaRef ds:uri="http://purl.org/dc/elements/1.1/"/>
+    <ds:schemaRef ds:uri="http://purl.org/dc/terms/"/>
+    <ds:schemaRef ds:uri="http://schemas.openxmlformats.org/package/2006/metadata/core-properties"/>
+    <ds:schemaRef ds:uri="http://purl.org/dc/dcmitype/"/>
+    <ds:schemaRef ds:uri="http://schemas.microsoft.com/office/2006/documentManagement/types"/>
+    <ds:schemaRef ds:uri="http://schemas.microsoft.com/office/infopath/2007/PartnerControls"/>
+    <ds:schemaRef ds:uri="http://www.w3.org/XML/1998/namespace"/>
+  </ds:schemaRefs>
+</ds:datastoreItem>
+</file>
+
+<file path=customXml/itemProps3.xml><?xml version="1.0" encoding="utf-8"?>
 <ds:datastoreItem xmlns:ds="http://schemas.openxmlformats.org/officeDocument/2006/customXml" ds:itemID="{B3F2B111-B156-46F7-9CCE-060B68D70E39}">
   <ds:schemaRefs>
     <ds:schemaRef ds:uri="http://schemas.microsoft.com/sharepoint/v3/contenttype/forms"/>
   </ds:schemaRefs>
 </ds:datastoreItem>
-</file>
-
-<file path=customXml/itemProps3.xml><?xml version="1.0" encoding="utf-8"?>
-<ds:datastoreItem xmlns:ds="http://schemas.openxmlformats.org/officeDocument/2006/customXml" ds:itemID="{2BC4359B-39BF-4631-A3A8-18D4D323FA7C}">
-  <ds:schemaRefs>
-    <ds:schemaRef ds:uri="http://purl.org/dc/terms/"/>
-    <ds:schemaRef ds:uri="http://schemas.openxmlformats.org/package/2006/metadata/core-properties"/>
-    <ds:schemaRef ds:uri="http://purl.org/dc/dcmitype/"/>
-    <ds:schemaRef ds:uri="http://schemas.microsoft.com/office/infopath/2007/PartnerControls"/>
-    <ds:schemaRef ds:uri="http://schemas.microsoft.com/office/2006/documentManagement/types"/>
-    <ds:schemaRef ds:uri="http://purl.org/dc/elements/1.1/"/>
-    <ds:schemaRef ds:uri="http://schemas.microsoft.com/office/2006/metadata/properties"/>
-    <ds:schemaRef ds:uri="625b0429-57c0-41ed-b4b9-cb84fb06689a"/>
-    <ds:schemaRef ds:uri="0a1749d7-1680-4b4c-ac1a-b66627f7b711"/>
-    <ds:schemaRef ds:uri="http://www.w3.org/XML/1998/namespace"/>
-  </ds:schemaRefs>
-</ds:datastoreItem>
 </file>
</xml_diff>

<commit_message>
Updated Azure Security - Proof of concepts.pptx
</commit_message>
<xml_diff>
--- a/scenarios/Azure Security - Proof of concepts.pptx
+++ b/scenarios/Azure Security - Proof of concepts.pptx
@@ -20,7 +20,6 @@
     <p:sldId id="268" r:id="rId17"/>
     <p:sldId id="269" r:id="rId18"/>
     <p:sldId id="270" r:id="rId19"/>
-    <p:sldId id="271" r:id="rId20"/>
   </p:sldIdLst>
   <p:sldSz cx="12192000" cy="6858000"/>
   <p:notesSz cx="6858000" cy="9144000"/>
@@ -7949,7 +7948,7 @@
           <a:p>
             <a:fld id="{53C998D3-C819-412A-870D-D0AAEB5CD01C}" type="datetimeFigureOut">
               <a:rPr lang="en-US" smtClean="0"/>
-              <a:t>4/19/2018</a:t>
+              <a:t>4/20/2018</a:t>
             </a:fld>
             <a:endParaRPr lang="en-US"/>
           </a:p>
@@ -8147,7 +8146,7 @@
           <a:p>
             <a:fld id="{53C998D3-C819-412A-870D-D0AAEB5CD01C}" type="datetimeFigureOut">
               <a:rPr lang="en-US" smtClean="0"/>
-              <a:t>4/19/2018</a:t>
+              <a:t>4/20/2018</a:t>
             </a:fld>
             <a:endParaRPr lang="en-US"/>
           </a:p>
@@ -8355,7 +8354,7 @@
           <a:p>
             <a:fld id="{53C998D3-C819-412A-870D-D0AAEB5CD01C}" type="datetimeFigureOut">
               <a:rPr lang="en-US" smtClean="0"/>
-              <a:t>4/19/2018</a:t>
+              <a:t>4/20/2018</a:t>
             </a:fld>
             <a:endParaRPr lang="en-US"/>
           </a:p>
@@ -8563,7 +8562,7 @@
           <a:p>
             <a:fld id="{53C998D3-C819-412A-870D-D0AAEB5CD01C}" type="datetimeFigureOut">
               <a:rPr lang="en-US" smtClean="0"/>
-              <a:t>4/19/2018</a:t>
+              <a:t>4/20/2018</a:t>
             </a:fld>
             <a:endParaRPr lang="en-US"/>
           </a:p>
@@ -8838,7 +8837,7 @@
           <a:p>
             <a:fld id="{53C998D3-C819-412A-870D-D0AAEB5CD01C}" type="datetimeFigureOut">
               <a:rPr lang="en-US" smtClean="0"/>
-              <a:t>4/19/2018</a:t>
+              <a:t>4/20/2018</a:t>
             </a:fld>
             <a:endParaRPr lang="en-US"/>
           </a:p>
@@ -9103,7 +9102,7 @@
           <a:p>
             <a:fld id="{53C998D3-C819-412A-870D-D0AAEB5CD01C}" type="datetimeFigureOut">
               <a:rPr lang="en-US" smtClean="0"/>
-              <a:t>4/19/2018</a:t>
+              <a:t>4/20/2018</a:t>
             </a:fld>
             <a:endParaRPr lang="en-US"/>
           </a:p>
@@ -9515,7 +9514,7 @@
           <a:p>
             <a:fld id="{53C998D3-C819-412A-870D-D0AAEB5CD01C}" type="datetimeFigureOut">
               <a:rPr lang="en-US" smtClean="0"/>
-              <a:t>4/19/2018</a:t>
+              <a:t>4/20/2018</a:t>
             </a:fld>
             <a:endParaRPr lang="en-US"/>
           </a:p>
@@ -9663,7 +9662,7 @@
           <a:p>
             <a:fld id="{53C998D3-C819-412A-870D-D0AAEB5CD01C}" type="datetimeFigureOut">
               <a:rPr lang="en-US" smtClean="0"/>
-              <a:t>4/19/2018</a:t>
+              <a:t>4/20/2018</a:t>
             </a:fld>
             <a:endParaRPr lang="en-US"/>
           </a:p>
@@ -9822,7 +9821,7 @@
           <a:p>
             <a:fld id="{53C998D3-C819-412A-870D-D0AAEB5CD01C}" type="datetimeFigureOut">
               <a:rPr lang="en-US" smtClean="0"/>
-              <a:t>4/19/2018</a:t>
+              <a:t>4/20/2018</a:t>
             </a:fld>
             <a:endParaRPr lang="en-US"/>
           </a:p>
@@ -10133,7 +10132,7 @@
           <a:p>
             <a:fld id="{53C998D3-C819-412A-870D-D0AAEB5CD01C}" type="datetimeFigureOut">
               <a:rPr lang="en-US" smtClean="0"/>
-              <a:t>4/19/2018</a:t>
+              <a:t>4/20/2018</a:t>
             </a:fld>
             <a:endParaRPr lang="en-US"/>
           </a:p>
@@ -10424,7 +10423,7 @@
           <a:p>
             <a:fld id="{53C998D3-C819-412A-870D-D0AAEB5CD01C}" type="datetimeFigureOut">
               <a:rPr lang="en-US" smtClean="0"/>
-              <a:t>4/19/2018</a:t>
+              <a:t>4/20/2018</a:t>
             </a:fld>
             <a:endParaRPr lang="en-US"/>
           </a:p>
@@ -10674,7 +10673,7 @@
           <a:p>
             <a:fld id="{53C998D3-C819-412A-870D-D0AAEB5CD01C}" type="datetimeFigureOut">
               <a:rPr lang="en-US" smtClean="0"/>
-              <a:t>4/19/2018</a:t>
+              <a:t>4/20/2018</a:t>
             </a:fld>
             <a:endParaRPr lang="en-US"/>
           </a:p>
@@ -17806,7 +17805,7 @@
                   <a:srgbClr val="FF0000"/>
                 </a:solidFill>
               </a:rPr>
-              <a:t>With- out DPS</a:t>
+              <a:t>Without DPS</a:t>
             </a:r>
           </a:p>
         </p:txBody>
@@ -17826,7 +17825,7 @@
         <p:spPr>
           <a:xfrm>
             <a:off x="6869179" y="5221482"/>
-            <a:ext cx="1638955" cy="369332"/>
+            <a:ext cx="2010837" cy="369332"/>
           </a:xfrm>
           <a:prstGeom prst="rect">
             <a:avLst/>
@@ -17845,7 +17844,7 @@
                   <a:schemeClr val="accent6"/>
                 </a:solidFill>
               </a:rPr>
-              <a:t>With DPS</a:t>
+              <a:t>With DPS Standard</a:t>
             </a:r>
           </a:p>
         </p:txBody>
@@ -19571,125 +19570,6 @@
       <p:bldP spid="41" grpId="0"/>
     </p:bldLst>
   </p:timing>
-</p:sld>
-</file>
-
-<file path=ppt/slides/slide16.xml><?xml version="1.0" encoding="utf-8"?>
-<p:sld xmlns:a="http://schemas.openxmlformats.org/drawingml/2006/main" xmlns:r="http://schemas.openxmlformats.org/officeDocument/2006/relationships" xmlns:p="http://schemas.openxmlformats.org/presentationml/2006/main">
-  <p:cSld>
-    <p:spTree>
-      <p:nvGrpSpPr>
-        <p:cNvPr id="1" name=""/>
-        <p:cNvGrpSpPr/>
-        <p:nvPr/>
-      </p:nvGrpSpPr>
-      <p:grpSpPr>
-        <a:xfrm>
-          <a:off x="0" y="0"/>
-          <a:ext cx="0" cy="0"/>
-          <a:chOff x="0" y="0"/>
-          <a:chExt cx="0" cy="0"/>
-        </a:xfrm>
-      </p:grpSpPr>
-      <p:pic>
-        <p:nvPicPr>
-          <p:cNvPr id="2050" name="Picture 2" descr="Azure DDoS Protection Service offerings">
-            <a:extLst>
-              <a:ext uri="{FF2B5EF4-FFF2-40B4-BE49-F238E27FC236}">
-                <a16:creationId xmlns:a16="http://schemas.microsoft.com/office/drawing/2014/main" id="{826DF1F5-0E76-4D6D-BAFD-E09F707EF2B1}"/>
-              </a:ext>
-            </a:extLst>
-          </p:cNvPr>
-          <p:cNvPicPr>
-            <a:picLocks noGrp="1" noChangeAspect="1" noChangeArrowheads="1"/>
-          </p:cNvPicPr>
-          <p:nvPr>
-            <p:ph idx="1"/>
-          </p:nvPr>
-        </p:nvPicPr>
-        <p:blipFill>
-          <a:blip r:embed="rId2">
-            <a:extLst>
-              <a:ext uri="{28A0092B-C50C-407E-A947-70E740481C1C}">
-                <a14:useLocalDpi xmlns:a14="http://schemas.microsoft.com/office/drawing/2010/main" val="0"/>
-              </a:ext>
-            </a:extLst>
-          </a:blip>
-          <a:srcRect/>
-          <a:stretch>
-            <a:fillRect/>
-          </a:stretch>
-        </p:blipFill>
-        <p:spPr bwMode="auto">
-          <a:xfrm>
-            <a:off x="1529335" y="1593318"/>
-            <a:ext cx="9161905" cy="4190476"/>
-          </a:xfrm>
-          <a:prstGeom prst="rect">
-            <a:avLst/>
-          </a:prstGeom>
-          <a:noFill/>
-          <a:extLst>
-            <a:ext uri="{909E8E84-426E-40DD-AFC4-6F175D3DCCD1}">
-              <a14:hiddenFill xmlns:a14="http://schemas.microsoft.com/office/drawing/2010/main">
-                <a:solidFill>
-                  <a:srgbClr val="FFFFFF"/>
-                </a:solidFill>
-              </a14:hiddenFill>
-            </a:ext>
-          </a:extLst>
-        </p:spPr>
-      </p:pic>
-      <p:sp>
-        <p:nvSpPr>
-          <p:cNvPr id="4" name="Rectangle 3">
-            <a:extLst>
-              <a:ext uri="{FF2B5EF4-FFF2-40B4-BE49-F238E27FC236}">
-                <a16:creationId xmlns:a16="http://schemas.microsoft.com/office/drawing/2014/main" id="{54E80E1E-BB7E-478F-A3D5-8F21977C7314}"/>
-              </a:ext>
-            </a:extLst>
-          </p:cNvPr>
-          <p:cNvSpPr/>
-          <p:nvPr/>
-        </p:nvSpPr>
-        <p:spPr>
-          <a:xfrm>
-            <a:off x="1529335" y="6196497"/>
-            <a:ext cx="9821839" cy="369332"/>
-          </a:xfrm>
-          <a:prstGeom prst="rect">
-            <a:avLst/>
-          </a:prstGeom>
-        </p:spPr>
-        <p:txBody>
-          <a:bodyPr wrap="square">
-            <a:spAutoFit/>
-          </a:bodyPr>
-          <a:lstStyle/>
-          <a:p>
-            <a:r>
-              <a:rPr lang="en-US" dirty="0">
-                <a:hlinkClick r:id="rId3"/>
-              </a:rPr>
-              <a:t>https://azure.microsoft.com/en-in/blog/azure-ddos-protection-service-preview/</a:t>
-            </a:r>
-            <a:r>
-              <a:rPr lang="en-US" dirty="0"/>
-              <a:t> </a:t>
-            </a:r>
-          </a:p>
-        </p:txBody>
-      </p:sp>
-    </p:spTree>
-    <p:extLst>
-      <p:ext uri="{BB962C8B-B14F-4D97-AF65-F5344CB8AC3E}">
-        <p14:creationId xmlns:p14="http://schemas.microsoft.com/office/powerpoint/2010/main" val="826921587"/>
-      </p:ext>
-    </p:extLst>
-  </p:cSld>
-  <p:clrMapOvr>
-    <a:masterClrMapping/>
-  </p:clrMapOvr>
 </p:sld>
 </file>
 
@@ -32763,6 +32643,21 @@
 </file>
 
 <file path=customXml/item1.xml><?xml version="1.0" encoding="utf-8"?>
+<?mso-contentType ?>
+<FormTemplates xmlns="http://schemas.microsoft.com/sharepoint/v3/contenttype/forms">
+  <Display>DocumentLibraryForm</Display>
+  <Edit>DocumentLibraryForm</Edit>
+  <New>DocumentLibraryForm</New>
+</FormTemplates>
+</file>
+
+<file path=customXml/item2.xml><?xml version="1.0" encoding="utf-8"?>
+<p:properties xmlns:p="http://schemas.microsoft.com/office/2006/metadata/properties" xmlns:xsi="http://www.w3.org/2001/XMLSchema-instance" xmlns:pc="http://schemas.microsoft.com/office/infopath/2007/PartnerControls">
+  <documentManagement/>
+</p:properties>
+</file>
+
+<file path=customXml/item3.xml><?xml version="1.0" encoding="utf-8"?>
 <ct:contentTypeSchema xmlns:ct="http://schemas.microsoft.com/office/2006/metadata/contentType" xmlns:ma="http://schemas.microsoft.com/office/2006/metadata/properties/metaAttributes" ct:_="" ma:_="" ma:contentTypeName="Document" ma:contentTypeID="0x0101003D63ADDD7F57C84B8D529CA73E1B98CB" ma:contentTypeVersion="7" ma:contentTypeDescription="Create a new document." ma:contentTypeScope="" ma:versionID="9064f22c5fb9dbe79858a8cdf6e712ce">
   <xsd:schema xmlns:xsd="http://www.w3.org/2001/XMLSchema" xmlns:xs="http://www.w3.org/2001/XMLSchema" xmlns:p="http://schemas.microsoft.com/office/2006/metadata/properties" xmlns:ns2="0a1749d7-1680-4b4c-ac1a-b66627f7b711" xmlns:ns3="625b0429-57c0-41ed-b4b9-cb84fb06689a" targetNamespace="http://schemas.microsoft.com/office/2006/metadata/properties" ma:root="true" ma:fieldsID="cf1e750c1e05d2200690044012d38e6b" ns2:_="" ns3:_="">
     <xsd:import namespace="0a1749d7-1680-4b4c-ac1a-b66627f7b711"/>
@@ -32947,22 +32842,32 @@
 </ct:contentTypeSchema>
 </file>
 
-<file path=customXml/item2.xml><?xml version="1.0" encoding="utf-8"?>
-<p:properties xmlns:p="http://schemas.microsoft.com/office/2006/metadata/properties" xmlns:xsi="http://www.w3.org/2001/XMLSchema-instance" xmlns:pc="http://schemas.microsoft.com/office/infopath/2007/PartnerControls">
-  <documentManagement/>
-</p:properties>
+<file path=customXml/itemProps1.xml><?xml version="1.0" encoding="utf-8"?>
+<ds:datastoreItem xmlns:ds="http://schemas.openxmlformats.org/officeDocument/2006/customXml" ds:itemID="{B3F2B111-B156-46F7-9CCE-060B68D70E39}">
+  <ds:schemaRefs>
+    <ds:schemaRef ds:uri="http://schemas.microsoft.com/sharepoint/v3/contenttype/forms"/>
+  </ds:schemaRefs>
+</ds:datastoreItem>
 </file>
 
-<file path=customXml/item3.xml><?xml version="1.0" encoding="utf-8"?>
-<?mso-contentType ?>
-<FormTemplates xmlns="http://schemas.microsoft.com/sharepoint/v3/contenttype/forms">
-  <Display>DocumentLibraryForm</Display>
-  <Edit>DocumentLibraryForm</Edit>
-  <New>DocumentLibraryForm</New>
-</FormTemplates>
+<file path=customXml/itemProps2.xml><?xml version="1.0" encoding="utf-8"?>
+<ds:datastoreItem xmlns:ds="http://schemas.openxmlformats.org/officeDocument/2006/customXml" ds:itemID="{2BC4359B-39BF-4631-A3A8-18D4D323FA7C}">
+  <ds:schemaRefs>
+    <ds:schemaRef ds:uri="http://purl.org/dc/elements/1.1/"/>
+    <ds:schemaRef ds:uri="http://schemas.microsoft.com/office/2006/metadata/properties"/>
+    <ds:schemaRef ds:uri="625b0429-57c0-41ed-b4b9-cb84fb06689a"/>
+    <ds:schemaRef ds:uri="0a1749d7-1680-4b4c-ac1a-b66627f7b711"/>
+    <ds:schemaRef ds:uri="http://purl.org/dc/terms/"/>
+    <ds:schemaRef ds:uri="http://schemas.openxmlformats.org/package/2006/metadata/core-properties"/>
+    <ds:schemaRef ds:uri="http://purl.org/dc/dcmitype/"/>
+    <ds:schemaRef ds:uri="http://schemas.microsoft.com/office/2006/documentManagement/types"/>
+    <ds:schemaRef ds:uri="http://schemas.microsoft.com/office/infopath/2007/PartnerControls"/>
+    <ds:schemaRef ds:uri="http://www.w3.org/XML/1998/namespace"/>
+  </ds:schemaRefs>
+</ds:datastoreItem>
 </file>
 
-<file path=customXml/itemProps1.xml><?xml version="1.0" encoding="utf-8"?>
+<file path=customXml/itemProps3.xml><?xml version="1.0" encoding="utf-8"?>
 <ds:datastoreItem xmlns:ds="http://schemas.openxmlformats.org/officeDocument/2006/customXml" ds:itemID="{4603885D-4C39-42A8-AC71-854EFA531F1A}">
   <ds:schemaRefs>
     <ds:schemaRef ds:uri="http://schemas.microsoft.com/office/2006/metadata/contentType"/>
@@ -32979,29 +32884,4 @@
     <ds:schemaRef ds:uri="http://schemas.microsoft.com/internal/obd"/>
   </ds:schemaRefs>
 </ds:datastoreItem>
-</file>
-
-<file path=customXml/itemProps2.xml><?xml version="1.0" encoding="utf-8"?>
-<ds:datastoreItem xmlns:ds="http://schemas.openxmlformats.org/officeDocument/2006/customXml" ds:itemID="{2BC4359B-39BF-4631-A3A8-18D4D323FA7C}">
-  <ds:schemaRefs>
-    <ds:schemaRef ds:uri="http://schemas.microsoft.com/office/2006/metadata/properties"/>
-    <ds:schemaRef ds:uri="625b0429-57c0-41ed-b4b9-cb84fb06689a"/>
-    <ds:schemaRef ds:uri="0a1749d7-1680-4b4c-ac1a-b66627f7b711"/>
-    <ds:schemaRef ds:uri="http://purl.org/dc/elements/1.1/"/>
-    <ds:schemaRef ds:uri="http://purl.org/dc/terms/"/>
-    <ds:schemaRef ds:uri="http://schemas.openxmlformats.org/package/2006/metadata/core-properties"/>
-    <ds:schemaRef ds:uri="http://purl.org/dc/dcmitype/"/>
-    <ds:schemaRef ds:uri="http://schemas.microsoft.com/office/2006/documentManagement/types"/>
-    <ds:schemaRef ds:uri="http://schemas.microsoft.com/office/infopath/2007/PartnerControls"/>
-    <ds:schemaRef ds:uri="http://www.w3.org/XML/1998/namespace"/>
-  </ds:schemaRefs>
-</ds:datastoreItem>
-</file>
-
-<file path=customXml/itemProps3.xml><?xml version="1.0" encoding="utf-8"?>
-<ds:datastoreItem xmlns:ds="http://schemas.openxmlformats.org/officeDocument/2006/customXml" ds:itemID="{B3F2B111-B156-46F7-9CCE-060B68D70E39}">
-  <ds:schemaRefs>
-    <ds:schemaRef ds:uri="http://schemas.microsoft.com/sharepoint/v3/contenttype/forms"/>
-  </ds:schemaRefs>
-</ds:datastoreItem>
 </file>
</xml_diff>

<commit_message>
Updated PPT and document references
</commit_message>
<xml_diff>
--- a/scenarios/Azure Security - Proof of concepts.pptx
+++ b/scenarios/Azure Security - Proof of concepts.pptx
@@ -20,7 +20,6 @@
     <p:sldId id="268" r:id="rId17"/>
     <p:sldId id="269" r:id="rId18"/>
     <p:sldId id="270" r:id="rId19"/>
-    <p:sldId id="271" r:id="rId20"/>
   </p:sldIdLst>
   <p:sldSz cx="12192000" cy="6858000"/>
   <p:notesSz cx="6858000" cy="9144000"/>
@@ -125,570 +124,6 @@
     </p:ext>
   </p:extLst>
 </p:presentation>
-</file>
-
-<file path=ppt/changesInfos/changesInfo1.xml><?xml version="1.0" encoding="utf-8"?>
-<pc:chgInfo xmlns:a="http://schemas.openxmlformats.org/drawingml/2006/main" xmlns:r="http://schemas.openxmlformats.org/officeDocument/2006/relationships" xmlns:ac="http://schemas.microsoft.com/office/drawing/2013/main/command" xmlns:pc="http://schemas.microsoft.com/office/powerpoint/2013/main/command">
-  <pc:docChgLst>
-    <pc:chgData name="Shabuddin Khan" userId="6572cdad-dc51-4cbc-b875-d48199489fd3" providerId="ADAL" clId="{FA00299C-1677-4761-8860-DECAFE39DA97}"/>
-    <pc:docChg chg="undo redo custSel addSld modSld">
-      <pc:chgData name="Shabuddin Khan" userId="6572cdad-dc51-4cbc-b875-d48199489fd3" providerId="ADAL" clId="{FA00299C-1677-4761-8860-DECAFE39DA97}" dt="2018-03-21T16:50:34.334" v="2517" actId="122"/>
-      <pc:docMkLst>
-        <pc:docMk/>
-      </pc:docMkLst>
-      <pc:sldChg chg="addSp delSp modSp add addAnim delAnim modAnim">
-        <pc:chgData name="Shabuddin Khan" userId="6572cdad-dc51-4cbc-b875-d48199489fd3" providerId="ADAL" clId="{FA00299C-1677-4761-8860-DECAFE39DA97}" dt="2018-03-21T10:52:41.847" v="2387" actId="122"/>
-        <pc:sldMkLst>
-          <pc:docMk/>
-          <pc:sldMk cId="3720355804" sldId="263"/>
-        </pc:sldMkLst>
-        <pc:spChg chg="mod">
-          <ac:chgData name="Shabuddin Khan" userId="6572cdad-dc51-4cbc-b875-d48199489fd3" providerId="ADAL" clId="{FA00299C-1677-4761-8860-DECAFE39DA97}" dt="2018-03-21T10:46:32.022" v="2361" actId="1076"/>
-          <ac:spMkLst>
-            <pc:docMk/>
-            <pc:sldMk cId="3720355804" sldId="263"/>
-            <ac:spMk id="2" creationId="{C8722A03-555A-4CAC-B46F-8E44301713BA}"/>
-          </ac:spMkLst>
-        </pc:spChg>
-        <pc:spChg chg="del">
-          <ac:chgData name="Shabuddin Khan" userId="6572cdad-dc51-4cbc-b875-d48199489fd3" providerId="ADAL" clId="{FA00299C-1677-4761-8860-DECAFE39DA97}" dt="2018-03-19T07:08:43.826" v="46" actId="478"/>
-          <ac:spMkLst>
-            <pc:docMk/>
-            <pc:sldMk cId="3720355804" sldId="263"/>
-            <ac:spMk id="3" creationId="{F8EF44F8-5B74-4BC1-81C0-CBA6778E000F}"/>
-          </ac:spMkLst>
-        </pc:spChg>
-        <pc:spChg chg="add mod">
-          <ac:chgData name="Shabuddin Khan" userId="6572cdad-dc51-4cbc-b875-d48199489fd3" providerId="ADAL" clId="{FA00299C-1677-4761-8860-DECAFE39DA97}" dt="2018-03-19T09:36:35.612" v="1007" actId="1076"/>
-          <ac:spMkLst>
-            <pc:docMk/>
-            <pc:sldMk cId="3720355804" sldId="263"/>
-            <ac:spMk id="4" creationId="{F3085B89-1CA0-4174-B279-1F818E5AFEB0}"/>
-          </ac:spMkLst>
-        </pc:spChg>
-        <pc:spChg chg="add del mod">
-          <ac:chgData name="Shabuddin Khan" userId="6572cdad-dc51-4cbc-b875-d48199489fd3" providerId="ADAL" clId="{FA00299C-1677-4761-8860-DECAFE39DA97}" dt="2018-03-19T07:21:34.313" v="59" actId="478"/>
-          <ac:spMkLst>
-            <pc:docMk/>
-            <pc:sldMk cId="3720355804" sldId="263"/>
-            <ac:spMk id="5" creationId="{7A318EC7-E20F-4A15-AEE1-EE7C39183B6A}"/>
-          </ac:spMkLst>
-        </pc:spChg>
-        <pc:spChg chg="add del mod">
-          <ac:chgData name="Shabuddin Khan" userId="6572cdad-dc51-4cbc-b875-d48199489fd3" providerId="ADAL" clId="{FA00299C-1677-4761-8860-DECAFE39DA97}" dt="2018-03-21T06:33:23.367" v="1720" actId="478"/>
-          <ac:spMkLst>
-            <pc:docMk/>
-            <pc:sldMk cId="3720355804" sldId="263"/>
-            <ac:spMk id="8" creationId="{73CFDA79-4EFE-4C21-9297-EBB802F56EF3}"/>
-          </ac:spMkLst>
-        </pc:spChg>
-        <pc:spChg chg="add mod ord">
-          <ac:chgData name="Shabuddin Khan" userId="6572cdad-dc51-4cbc-b875-d48199489fd3" providerId="ADAL" clId="{FA00299C-1677-4761-8860-DECAFE39DA97}" dt="2018-03-21T06:42:39.588" v="1845" actId="1036"/>
-          <ac:spMkLst>
-            <pc:docMk/>
-            <pc:sldMk cId="3720355804" sldId="263"/>
-            <ac:spMk id="19" creationId="{9E263DD8-0E70-4887-8F2A-473E94280659}"/>
-          </ac:spMkLst>
-        </pc:spChg>
-        <pc:spChg chg="add mod">
-          <ac:chgData name="Shabuddin Khan" userId="6572cdad-dc51-4cbc-b875-d48199489fd3" providerId="ADAL" clId="{FA00299C-1677-4761-8860-DECAFE39DA97}" dt="2018-03-21T06:47:44.251" v="1975" actId="1076"/>
-          <ac:spMkLst>
-            <pc:docMk/>
-            <pc:sldMk cId="3720355804" sldId="263"/>
-            <ac:spMk id="22" creationId="{D6040024-A35D-477B-89D8-66C1B8539231}"/>
-          </ac:spMkLst>
-        </pc:spChg>
-        <pc:spChg chg="add del mod">
-          <ac:chgData name="Shabuddin Khan" userId="6572cdad-dc51-4cbc-b875-d48199489fd3" providerId="ADAL" clId="{FA00299C-1677-4761-8860-DECAFE39DA97}" dt="2018-03-21T06:21:37.265" v="1467" actId="478"/>
-          <ac:spMkLst>
-            <pc:docMk/>
-            <pc:sldMk cId="3720355804" sldId="263"/>
-            <ac:spMk id="24" creationId="{414ECBCA-2672-4E82-AE29-89665BACB3FF}"/>
-          </ac:spMkLst>
-        </pc:spChg>
-        <pc:spChg chg="add mod">
-          <ac:chgData name="Shabuddin Khan" userId="6572cdad-dc51-4cbc-b875-d48199489fd3" providerId="ADAL" clId="{FA00299C-1677-4761-8860-DECAFE39DA97}" dt="2018-03-21T06:56:24.604" v="2321" actId="20577"/>
-          <ac:spMkLst>
-            <pc:docMk/>
-            <pc:sldMk cId="3720355804" sldId="263"/>
-            <ac:spMk id="36" creationId="{FBADA058-2DB3-4252-87DB-975CDE17F281}"/>
-          </ac:spMkLst>
-        </pc:spChg>
-        <pc:spChg chg="add mod">
-          <ac:chgData name="Shabuddin Khan" userId="6572cdad-dc51-4cbc-b875-d48199489fd3" providerId="ADAL" clId="{FA00299C-1677-4761-8860-DECAFE39DA97}" dt="2018-03-21T06:52:50.954" v="2263" actId="1038"/>
-          <ac:spMkLst>
-            <pc:docMk/>
-            <pc:sldMk cId="3720355804" sldId="263"/>
-            <ac:spMk id="37" creationId="{34D51280-9ADD-4226-A983-4967AA06534C}"/>
-          </ac:spMkLst>
-        </pc:spChg>
-        <pc:spChg chg="add mod">
-          <ac:chgData name="Shabuddin Khan" userId="6572cdad-dc51-4cbc-b875-d48199489fd3" providerId="ADAL" clId="{FA00299C-1677-4761-8860-DECAFE39DA97}" dt="2018-03-21T06:48:25.295" v="2126" actId="1037"/>
-          <ac:spMkLst>
-            <pc:docMk/>
-            <pc:sldMk cId="3720355804" sldId="263"/>
-            <ac:spMk id="53" creationId="{23C046B3-12F2-4FEA-AC34-E9A29CBB42FB}"/>
-          </ac:spMkLst>
-        </pc:spChg>
-        <pc:spChg chg="add mod">
-          <ac:chgData name="Shabuddin Khan" userId="6572cdad-dc51-4cbc-b875-d48199489fd3" providerId="ADAL" clId="{FA00299C-1677-4761-8860-DECAFE39DA97}" dt="2018-03-21T06:52:23" v="2259" actId="122"/>
-          <ac:spMkLst>
-            <pc:docMk/>
-            <pc:sldMk cId="3720355804" sldId="263"/>
-            <ac:spMk id="55" creationId="{B7B81A51-C5E8-4D6A-8D8F-1E0CFC2E4F76}"/>
-          </ac:spMkLst>
-        </pc:spChg>
-        <pc:spChg chg="add mod">
-          <ac:chgData name="Shabuddin Khan" userId="6572cdad-dc51-4cbc-b875-d48199489fd3" providerId="ADAL" clId="{FA00299C-1677-4761-8860-DECAFE39DA97}" dt="2018-03-21T06:42:39.588" v="1845" actId="1036"/>
-          <ac:spMkLst>
-            <pc:docMk/>
-            <pc:sldMk cId="3720355804" sldId="263"/>
-            <ac:spMk id="56" creationId="{7289D867-8701-4CE3-BB3F-BE4814B75795}"/>
-          </ac:spMkLst>
-        </pc:spChg>
-        <pc:spChg chg="add mod ord">
-          <ac:chgData name="Shabuddin Khan" userId="6572cdad-dc51-4cbc-b875-d48199489fd3" providerId="ADAL" clId="{FA00299C-1677-4761-8860-DECAFE39DA97}" dt="2018-03-21T06:42:39.588" v="1845" actId="1036"/>
-          <ac:spMkLst>
-            <pc:docMk/>
-            <pc:sldMk cId="3720355804" sldId="263"/>
-            <ac:spMk id="61" creationId="{72CA8FAF-934C-48C3-94B3-0742E3BB4953}"/>
-          </ac:spMkLst>
-        </pc:spChg>
-        <pc:spChg chg="add mod">
-          <ac:chgData name="Shabuddin Khan" userId="6572cdad-dc51-4cbc-b875-d48199489fd3" providerId="ADAL" clId="{FA00299C-1677-4761-8860-DECAFE39DA97}" dt="2018-03-21T10:50:32.026" v="2375" actId="1076"/>
-          <ac:spMkLst>
-            <pc:docMk/>
-            <pc:sldMk cId="3720355804" sldId="263"/>
-            <ac:spMk id="67" creationId="{1BD5791C-F11B-44F4-A88B-DE14524EE9A2}"/>
-          </ac:spMkLst>
-        </pc:spChg>
-        <pc:spChg chg="add mod">
-          <ac:chgData name="Shabuddin Khan" userId="6572cdad-dc51-4cbc-b875-d48199489fd3" providerId="ADAL" clId="{FA00299C-1677-4761-8860-DECAFE39DA97}" dt="2018-03-21T06:48:17.439" v="2084" actId="1037"/>
-          <ac:spMkLst>
-            <pc:docMk/>
-            <pc:sldMk cId="3720355804" sldId="263"/>
-            <ac:spMk id="78" creationId="{E8944280-243E-489A-8DF2-319DFF8A8CE2}"/>
-          </ac:spMkLst>
-        </pc:spChg>
-        <pc:spChg chg="add mod ord">
-          <ac:chgData name="Shabuddin Khan" userId="6572cdad-dc51-4cbc-b875-d48199489fd3" providerId="ADAL" clId="{FA00299C-1677-4761-8860-DECAFE39DA97}" dt="2018-03-21T06:42:39.588" v="1845" actId="1036"/>
-          <ac:spMkLst>
-            <pc:docMk/>
-            <pc:sldMk cId="3720355804" sldId="263"/>
-            <ac:spMk id="85" creationId="{7D7D3F09-3293-4F40-A4A1-C005F41613CC}"/>
-          </ac:spMkLst>
-        </pc:spChg>
-        <pc:spChg chg="add del mod">
-          <ac:chgData name="Shabuddin Khan" userId="6572cdad-dc51-4cbc-b875-d48199489fd3" providerId="ADAL" clId="{FA00299C-1677-4761-8860-DECAFE39DA97}" dt="2018-03-19T09:31:55.712" v="928" actId="478"/>
-          <ac:spMkLst>
-            <pc:docMk/>
-            <pc:sldMk cId="3720355804" sldId="263"/>
-            <ac:spMk id="1036" creationId="{041BB5BB-FA8E-4162-BC9C-0D0658A11308}"/>
-          </ac:spMkLst>
-        </pc:spChg>
-        <pc:spChg chg="add mod">
-          <ac:chgData name="Shabuddin Khan" userId="6572cdad-dc51-4cbc-b875-d48199489fd3" providerId="ADAL" clId="{FA00299C-1677-4761-8860-DECAFE39DA97}" dt="2018-03-21T06:44:01.382" v="1914" actId="20577"/>
-          <ac:spMkLst>
-            <pc:docMk/>
-            <pc:sldMk cId="3720355804" sldId="263"/>
-            <ac:spMk id="1037" creationId="{B6EEB600-0DA3-4409-908E-AE231FA28EEA}"/>
-          </ac:spMkLst>
-        </pc:spChg>
-        <pc:spChg chg="add del mod">
-          <ac:chgData name="Shabuddin Khan" userId="6572cdad-dc51-4cbc-b875-d48199489fd3" providerId="ADAL" clId="{FA00299C-1677-4761-8860-DECAFE39DA97}" dt="2018-03-21T06:52:04.277" v="2258" actId="121"/>
-          <ac:spMkLst>
-            <pc:docMk/>
-            <pc:sldMk cId="3720355804" sldId="263"/>
-            <ac:spMk id="1040" creationId="{80A3B630-51C8-4B35-A7B3-B2095FC785FE}"/>
-          </ac:spMkLst>
-        </pc:spChg>
-        <pc:spChg chg="add del mod">
-          <ac:chgData name="Shabuddin Khan" userId="6572cdad-dc51-4cbc-b875-d48199489fd3" providerId="ADAL" clId="{FA00299C-1677-4761-8860-DECAFE39DA97}" dt="2018-03-21T06:51:50.603" v="2257" actId="20577"/>
-          <ac:spMkLst>
-            <pc:docMk/>
-            <pc:sldMk cId="3720355804" sldId="263"/>
-            <ac:spMk id="1041" creationId="{1A003C55-6349-493D-8D4F-B35E93D7E8CE}"/>
-          </ac:spMkLst>
-        </pc:spChg>
-        <pc:spChg chg="add mod">
-          <ac:chgData name="Shabuddin Khan" userId="6572cdad-dc51-4cbc-b875-d48199489fd3" providerId="ADAL" clId="{FA00299C-1677-4761-8860-DECAFE39DA97}" dt="2018-03-21T06:52:30.264" v="2260" actId="122"/>
-          <ac:spMkLst>
-            <pc:docMk/>
-            <pc:sldMk cId="3720355804" sldId="263"/>
-            <ac:spMk id="1042" creationId="{970FB498-91EE-4CB4-8806-11C1B0152079}"/>
-          </ac:spMkLst>
-        </pc:spChg>
-        <pc:picChg chg="add mod">
-          <ac:chgData name="Shabuddin Khan" userId="6572cdad-dc51-4cbc-b875-d48199489fd3" providerId="ADAL" clId="{FA00299C-1677-4761-8860-DECAFE39DA97}" dt="2018-03-21T06:56:38.112" v="2326" actId="1035"/>
-          <ac:picMkLst>
-            <pc:docMk/>
-            <pc:sldMk cId="3720355804" sldId="263"/>
-            <ac:picMk id="7" creationId="{412497F6-EDFD-4FE8-9653-C9401C81A965}"/>
-          </ac:picMkLst>
-        </pc:picChg>
-        <pc:picChg chg="add del mod">
-          <ac:chgData name="Shabuddin Khan" userId="6572cdad-dc51-4cbc-b875-d48199489fd3" providerId="ADAL" clId="{FA00299C-1677-4761-8860-DECAFE39DA97}" dt="2018-03-19T07:26:40.023" v="171" actId="122"/>
-          <ac:picMkLst>
-            <pc:docMk/>
-            <pc:sldMk cId="3720355804" sldId="263"/>
-            <ac:picMk id="10" creationId="{F3B01A79-8198-49DA-8C4D-0C069A69F92B}"/>
-          </ac:picMkLst>
-        </pc:picChg>
-        <pc:picChg chg="add del mod">
-          <ac:chgData name="Shabuddin Khan" userId="6572cdad-dc51-4cbc-b875-d48199489fd3" providerId="ADAL" clId="{FA00299C-1677-4761-8860-DECAFE39DA97}" dt="2018-03-19T07:26:37.796" v="167" actId="122"/>
-          <ac:picMkLst>
-            <pc:docMk/>
-            <pc:sldMk cId="3720355804" sldId="263"/>
-            <ac:picMk id="12" creationId="{80F67680-7D54-4459-8D29-A0569638B849}"/>
-          </ac:picMkLst>
-        </pc:picChg>
-        <pc:picChg chg="add del mod">
-          <ac:chgData name="Shabuddin Khan" userId="6572cdad-dc51-4cbc-b875-d48199489fd3" providerId="ADAL" clId="{FA00299C-1677-4761-8860-DECAFE39DA97}" dt="2018-03-19T07:43:41.326" v="552" actId="478"/>
-          <ac:picMkLst>
-            <pc:docMk/>
-            <pc:sldMk cId="3720355804" sldId="263"/>
-            <ac:picMk id="14" creationId="{F69575F4-7DF7-488C-855C-1C9CF3B1ED8A}"/>
-          </ac:picMkLst>
-        </pc:picChg>
-        <pc:picChg chg="add del mod">
-          <ac:chgData name="Shabuddin Khan" userId="6572cdad-dc51-4cbc-b875-d48199489fd3" providerId="ADAL" clId="{FA00299C-1677-4761-8860-DECAFE39DA97}" dt="2018-03-21T06:42:39.588" v="1845" actId="1036"/>
-          <ac:picMkLst>
-            <pc:docMk/>
-            <pc:sldMk cId="3720355804" sldId="263"/>
-            <ac:picMk id="16" creationId="{791204A8-AEB0-4DAA-855F-92882FD58FD5}"/>
-          </ac:picMkLst>
-        </pc:picChg>
-        <pc:picChg chg="add del mod">
-          <ac:chgData name="Shabuddin Khan" userId="6572cdad-dc51-4cbc-b875-d48199489fd3" providerId="ADAL" clId="{FA00299C-1677-4761-8860-DECAFE39DA97}" dt="2018-03-21T06:33:41.151" v="1723" actId="478"/>
-          <ac:picMkLst>
-            <pc:docMk/>
-            <pc:sldMk cId="3720355804" sldId="263"/>
-            <ac:picMk id="18" creationId="{40C997B4-315C-4686-A4D5-B254AC39F8E0}"/>
-          </ac:picMkLst>
-        </pc:picChg>
-        <pc:picChg chg="add mod">
-          <ac:chgData name="Shabuddin Khan" userId="6572cdad-dc51-4cbc-b875-d48199489fd3" providerId="ADAL" clId="{FA00299C-1677-4761-8860-DECAFE39DA97}" dt="2018-03-21T10:05:02.199" v="2348" actId="1076"/>
-          <ac:picMkLst>
-            <pc:docMk/>
-            <pc:sldMk cId="3720355804" sldId="263"/>
-            <ac:picMk id="21" creationId="{F8F01813-247A-44A4-999E-83BAF8B1ACD7}"/>
-          </ac:picMkLst>
-        </pc:picChg>
-        <pc:picChg chg="add mod">
-          <ac:chgData name="Shabuddin Khan" userId="6572cdad-dc51-4cbc-b875-d48199489fd3" providerId="ADAL" clId="{FA00299C-1677-4761-8860-DECAFE39DA97}" dt="2018-03-21T06:42:39.588" v="1845" actId="1036"/>
-          <ac:picMkLst>
-            <pc:docMk/>
-            <pc:sldMk cId="3720355804" sldId="263"/>
-            <ac:picMk id="23" creationId="{DF22F11E-1090-4F39-BBC0-52988581321B}"/>
-          </ac:picMkLst>
-        </pc:picChg>
-        <pc:picChg chg="add mod">
-          <ac:chgData name="Shabuddin Khan" userId="6572cdad-dc51-4cbc-b875-d48199489fd3" providerId="ADAL" clId="{FA00299C-1677-4761-8860-DECAFE39DA97}" dt="2018-03-21T06:48:10.249" v="2043" actId="1038"/>
-          <ac:picMkLst>
-            <pc:docMk/>
-            <pc:sldMk cId="3720355804" sldId="263"/>
-            <ac:picMk id="25" creationId="{EE67E757-5B1F-48BC-B3D9-E7BB147A1912}"/>
-          </ac:picMkLst>
-        </pc:picChg>
-        <pc:picChg chg="add del mod">
-          <ac:chgData name="Shabuddin Khan" userId="6572cdad-dc51-4cbc-b875-d48199489fd3" providerId="ADAL" clId="{FA00299C-1677-4761-8860-DECAFE39DA97}" dt="2018-03-21T06:47:28.372" v="1973" actId="478"/>
-          <ac:picMkLst>
-            <pc:docMk/>
-            <pc:sldMk cId="3720355804" sldId="263"/>
-            <ac:picMk id="26" creationId="{8067A2E8-CF5B-4443-9718-C0D50E71CAF1}"/>
-          </ac:picMkLst>
-        </pc:picChg>
-        <pc:picChg chg="add del mod">
-          <ac:chgData name="Shabuddin Khan" userId="6572cdad-dc51-4cbc-b875-d48199489fd3" providerId="ADAL" clId="{FA00299C-1677-4761-8860-DECAFE39DA97}" dt="2018-03-21T06:42:39.588" v="1845" actId="1036"/>
-          <ac:picMkLst>
-            <pc:docMk/>
-            <pc:sldMk cId="3720355804" sldId="263"/>
-            <ac:picMk id="27" creationId="{8A57CA20-53A0-4228-BDBA-EE9DBC7A0A58}"/>
-          </ac:picMkLst>
-        </pc:picChg>
-        <pc:picChg chg="add del mod">
-          <ac:chgData name="Shabuddin Khan" userId="6572cdad-dc51-4cbc-b875-d48199489fd3" providerId="ADAL" clId="{FA00299C-1677-4761-8860-DECAFE39DA97}" dt="2018-03-19T07:33:09.025" v="382" actId="478"/>
-          <ac:picMkLst>
-            <pc:docMk/>
-            <pc:sldMk cId="3720355804" sldId="263"/>
-            <ac:picMk id="28" creationId="{8862B748-1512-4D31-B225-67B5EA660A87}"/>
-          </ac:picMkLst>
-        </pc:picChg>
-        <pc:picChg chg="add del mod">
-          <ac:chgData name="Shabuddin Khan" userId="6572cdad-dc51-4cbc-b875-d48199489fd3" providerId="ADAL" clId="{FA00299C-1677-4761-8860-DECAFE39DA97}" dt="2018-03-21T06:33:41.151" v="1723" actId="478"/>
-          <ac:picMkLst>
-            <pc:docMk/>
-            <pc:sldMk cId="3720355804" sldId="263"/>
-            <ac:picMk id="30" creationId="{D3AFEC2E-0E7D-47DD-8023-81C708FC5C69}"/>
-          </ac:picMkLst>
-        </pc:picChg>
-        <pc:picChg chg="add del mod">
-          <ac:chgData name="Shabuddin Khan" userId="6572cdad-dc51-4cbc-b875-d48199489fd3" providerId="ADAL" clId="{FA00299C-1677-4761-8860-DECAFE39DA97}" dt="2018-03-19T09:29:22.296" v="913" actId="122"/>
-          <ac:picMkLst>
-            <pc:docMk/>
-            <pc:sldMk cId="3720355804" sldId="263"/>
-            <ac:picMk id="32" creationId="{DEB0B7A2-8128-4965-A4BF-CA809CACACC8}"/>
-          </ac:picMkLst>
-        </pc:picChg>
-        <pc:picChg chg="add del mod">
-          <ac:chgData name="Shabuddin Khan" userId="6572cdad-dc51-4cbc-b875-d48199489fd3" providerId="ADAL" clId="{FA00299C-1677-4761-8860-DECAFE39DA97}" dt="2018-03-19T09:31:45.199" v="926" actId="122"/>
-          <ac:picMkLst>
-            <pc:docMk/>
-            <pc:sldMk cId="3720355804" sldId="263"/>
-            <ac:picMk id="34" creationId="{9B252173-3B17-41DD-957E-CDDF9346A9EB}"/>
-          </ac:picMkLst>
-        </pc:picChg>
-        <pc:picChg chg="add del mod">
-          <ac:chgData name="Shabuddin Khan" userId="6572cdad-dc51-4cbc-b875-d48199489fd3" providerId="ADAL" clId="{FA00299C-1677-4761-8860-DECAFE39DA97}" dt="2018-03-21T06:42:39.588" v="1845" actId="1036"/>
-          <ac:picMkLst>
-            <pc:docMk/>
-            <pc:sldMk cId="3720355804" sldId="263"/>
-            <ac:picMk id="35" creationId="{337D3AA2-28F0-4A58-9C0C-C817AFC037F8}"/>
-          </ac:picMkLst>
-        </pc:picChg>
-        <pc:picChg chg="add del">
-          <ac:chgData name="Shabuddin Khan" userId="6572cdad-dc51-4cbc-b875-d48199489fd3" providerId="ADAL" clId="{FA00299C-1677-4761-8860-DECAFE39DA97}" dt="2018-03-19T09:31:43.805" v="923" actId="122"/>
-          <ac:picMkLst>
-            <pc:docMk/>
-            <pc:sldMk cId="3720355804" sldId="263"/>
-            <ac:picMk id="36" creationId="{91D8A1E5-57C6-4FBA-A098-196D5ABE56E6}"/>
-          </ac:picMkLst>
-        </pc:picChg>
-        <pc:picChg chg="add del mod">
-          <ac:chgData name="Shabuddin Khan" userId="6572cdad-dc51-4cbc-b875-d48199489fd3" providerId="ADAL" clId="{FA00299C-1677-4761-8860-DECAFE39DA97}" dt="2018-03-21T06:41:15.758" v="1781" actId="122"/>
-          <ac:picMkLst>
-            <pc:docMk/>
-            <pc:sldMk cId="3720355804" sldId="263"/>
-            <ac:picMk id="38" creationId="{116344E1-DC91-4CF5-A229-8DF0E3F9E9A7}"/>
-          </ac:picMkLst>
-        </pc:picChg>
-        <pc:picChg chg="add mod">
-          <ac:chgData name="Shabuddin Khan" userId="6572cdad-dc51-4cbc-b875-d48199489fd3" providerId="ADAL" clId="{FA00299C-1677-4761-8860-DECAFE39DA97}" dt="2018-03-21T06:46:15.216" v="1947" actId="14100"/>
-          <ac:picMkLst>
-            <pc:docMk/>
-            <pc:sldMk cId="3720355804" sldId="263"/>
-            <ac:picMk id="40" creationId="{ADD8E3C9-8035-4C50-A700-1F03DB4C6B4C}"/>
-          </ac:picMkLst>
-        </pc:picChg>
-        <pc:picChg chg="add del mod">
-          <ac:chgData name="Shabuddin Khan" userId="6572cdad-dc51-4cbc-b875-d48199489fd3" providerId="ADAL" clId="{FA00299C-1677-4761-8860-DECAFE39DA97}" dt="2018-03-19T09:21:57.857" v="841" actId="478"/>
-          <ac:picMkLst>
-            <pc:docMk/>
-            <pc:sldMk cId="3720355804" sldId="263"/>
-            <ac:picMk id="40" creationId="{226BBE02-AEDC-47F1-AE1B-B3384E01A374}"/>
-          </ac:picMkLst>
-        </pc:picChg>
-        <pc:picChg chg="add del">
-          <ac:chgData name="Shabuddin Khan" userId="6572cdad-dc51-4cbc-b875-d48199489fd3" providerId="ADAL" clId="{FA00299C-1677-4761-8860-DECAFE39DA97}" dt="2018-03-19T07:37:28.471" v="471" actId="122"/>
-          <ac:picMkLst>
-            <pc:docMk/>
-            <pc:sldMk cId="3720355804" sldId="263"/>
-            <ac:picMk id="41" creationId="{4C51217C-0ADD-4B58-A75E-999B75043C7D}"/>
-          </ac:picMkLst>
-        </pc:picChg>
-        <pc:picChg chg="add del mod">
-          <ac:chgData name="Shabuddin Khan" userId="6572cdad-dc51-4cbc-b875-d48199489fd3" providerId="ADAL" clId="{FA00299C-1677-4761-8860-DECAFE39DA97}" dt="2018-03-19T09:36:51.059" v="1011" actId="478"/>
-          <ac:picMkLst>
-            <pc:docMk/>
-            <pc:sldMk cId="3720355804" sldId="263"/>
-            <ac:picMk id="43" creationId="{51E6A767-46B4-4596-ACE6-06C3FA1F6CD2}"/>
-          </ac:picMkLst>
-        </pc:picChg>
-        <pc:picChg chg="add del mod">
-          <ac:chgData name="Shabuddin Khan" userId="6572cdad-dc51-4cbc-b875-d48199489fd3" providerId="ADAL" clId="{FA00299C-1677-4761-8860-DECAFE39DA97}" dt="2018-03-19T09:37:45.284" v="1017" actId="478"/>
-          <ac:picMkLst>
-            <pc:docMk/>
-            <pc:sldMk cId="3720355804" sldId="263"/>
-            <ac:picMk id="44" creationId="{ADF10086-8621-4A59-B2DA-9D5418F84B9D}"/>
-          </ac:picMkLst>
-        </pc:picChg>
-        <pc:picChg chg="add mod">
-          <ac:chgData name="Shabuddin Khan" userId="6572cdad-dc51-4cbc-b875-d48199489fd3" providerId="ADAL" clId="{FA00299C-1677-4761-8860-DECAFE39DA97}" dt="2018-03-21T06:42:39.588" v="1845" actId="1036"/>
-          <ac:picMkLst>
-            <pc:docMk/>
-            <pc:sldMk cId="3720355804" sldId="263"/>
-            <ac:picMk id="45" creationId="{770DBA86-D0E1-46E0-B9C8-F75BA91C7F3B}"/>
-          </ac:picMkLst>
-        </pc:picChg>
-        <pc:picChg chg="add mod">
-          <ac:chgData name="Shabuddin Khan" userId="6572cdad-dc51-4cbc-b875-d48199489fd3" providerId="ADAL" clId="{FA00299C-1677-4761-8860-DECAFE39DA97}" dt="2018-03-21T06:42:39.588" v="1845" actId="1036"/>
-          <ac:picMkLst>
-            <pc:docMk/>
-            <pc:sldMk cId="3720355804" sldId="263"/>
-            <ac:picMk id="52" creationId="{7DDBF1F4-93F5-4371-ACA0-7DB3247746F0}"/>
-          </ac:picMkLst>
-        </pc:picChg>
-        <pc:picChg chg="add mod">
-          <ac:chgData name="Shabuddin Khan" userId="6572cdad-dc51-4cbc-b875-d48199489fd3" providerId="ADAL" clId="{FA00299C-1677-4761-8860-DECAFE39DA97}" dt="2018-03-21T06:42:39.588" v="1845" actId="1036"/>
-          <ac:picMkLst>
-            <pc:docMk/>
-            <pc:sldMk cId="3720355804" sldId="263"/>
-            <ac:picMk id="54" creationId="{BF307567-CAAE-419C-BA20-6DDBB348B306}"/>
-          </ac:picMkLst>
-        </pc:picChg>
-        <pc:picChg chg="add del mod">
-          <ac:chgData name="Shabuddin Khan" userId="6572cdad-dc51-4cbc-b875-d48199489fd3" providerId="ADAL" clId="{FA00299C-1677-4761-8860-DECAFE39DA97}" dt="2018-03-19T09:24:36.006" v="848" actId="478"/>
-          <ac:picMkLst>
-            <pc:docMk/>
-            <pc:sldMk cId="3720355804" sldId="263"/>
-            <ac:picMk id="56" creationId="{2AAFD7BC-FCCD-4210-8DD8-A45A3606FCD1}"/>
-          </ac:picMkLst>
-        </pc:picChg>
-        <pc:picChg chg="add mod">
-          <ac:chgData name="Shabuddin Khan" userId="6572cdad-dc51-4cbc-b875-d48199489fd3" providerId="ADAL" clId="{FA00299C-1677-4761-8860-DECAFE39DA97}" dt="2018-03-21T06:44:53.380" v="1923" actId="1076"/>
-          <ac:picMkLst>
-            <pc:docMk/>
-            <pc:sldMk cId="3720355804" sldId="263"/>
-            <ac:picMk id="62" creationId="{8AF1D278-FA45-46EF-A604-5E42B77D082E}"/>
-          </ac:picMkLst>
-        </pc:picChg>
-        <pc:picChg chg="add del mod">
-          <ac:chgData name="Shabuddin Khan" userId="6572cdad-dc51-4cbc-b875-d48199489fd3" providerId="ADAL" clId="{FA00299C-1677-4761-8860-DECAFE39DA97}" dt="2018-03-19T09:24:53.207" v="855" actId="478"/>
-          <ac:picMkLst>
-            <pc:docMk/>
-            <pc:sldMk cId="3720355804" sldId="263"/>
-            <ac:picMk id="63" creationId="{710E5100-7995-488D-BB3B-C95DE2F20117}"/>
-          </ac:picMkLst>
-        </pc:picChg>
-        <pc:picChg chg="add mod">
-          <ac:chgData name="Shabuddin Khan" userId="6572cdad-dc51-4cbc-b875-d48199489fd3" providerId="ADAL" clId="{FA00299C-1677-4761-8860-DECAFE39DA97}" dt="2018-03-21T06:55:04.296" v="2275" actId="1076"/>
-          <ac:picMkLst>
-            <pc:docMk/>
-            <pc:sldMk cId="3720355804" sldId="263"/>
-            <ac:picMk id="66" creationId="{3C3AA10A-E028-4A43-9144-28202BCCE986}"/>
-          </ac:picMkLst>
-        </pc:picChg>
-        <pc:picChg chg="add mod">
-          <ac:chgData name="Shabuddin Khan" userId="6572cdad-dc51-4cbc-b875-d48199489fd3" providerId="ADAL" clId="{FA00299C-1677-4761-8860-DECAFE39DA97}" dt="2018-03-21T06:55:13.999" v="2278" actId="1036"/>
-          <ac:picMkLst>
-            <pc:docMk/>
-            <pc:sldMk cId="3720355804" sldId="263"/>
-            <ac:picMk id="1026" creationId="{BF9AB754-2EDE-4BDE-9592-D43702A5C6B2}"/>
-          </ac:picMkLst>
-        </pc:picChg>
-        <pc:picChg chg="add del mod">
-          <ac:chgData name="Shabuddin Khan" userId="6572cdad-dc51-4cbc-b875-d48199489fd3" providerId="ADAL" clId="{FA00299C-1677-4761-8860-DECAFE39DA97}" dt="2018-03-19T09:15:48.842" v="663" actId="478"/>
-          <ac:picMkLst>
-            <pc:docMk/>
-            <pc:sldMk cId="3720355804" sldId="263"/>
-            <ac:picMk id="1026" creationId="{52B52617-ED15-476F-8F7D-494DA9708099}"/>
-          </ac:picMkLst>
-        </pc:picChg>
-        <pc:picChg chg="add del mod">
-          <ac:chgData name="Shabuddin Khan" userId="6572cdad-dc51-4cbc-b875-d48199489fd3" providerId="ADAL" clId="{FA00299C-1677-4761-8860-DECAFE39DA97}" dt="2018-03-19T07:39:46.744" v="501" actId="478"/>
-          <ac:picMkLst>
-            <pc:docMk/>
-            <pc:sldMk cId="3720355804" sldId="263"/>
-            <ac:picMk id="1035" creationId="{8D66EE48-8594-43E9-9262-06614532A1D6}"/>
-          </ac:picMkLst>
-        </pc:picChg>
-        <pc:picChg chg="add mod">
-          <ac:chgData name="Shabuddin Khan" userId="6572cdad-dc51-4cbc-b875-d48199489fd3" providerId="ADAL" clId="{FA00299C-1677-4761-8860-DECAFE39DA97}" dt="2018-03-21T06:44:21.885" v="1915" actId="1076"/>
-          <ac:picMkLst>
-            <pc:docMk/>
-            <pc:sldMk cId="3720355804" sldId="263"/>
-            <ac:picMk id="1051" creationId="{BFE54276-6366-417E-81C5-DB98DB8AC750}"/>
-          </ac:picMkLst>
-        </pc:picChg>
-        <pc:picChg chg="add mod">
-          <ac:chgData name="Shabuddin Khan" userId="6572cdad-dc51-4cbc-b875-d48199489fd3" providerId="ADAL" clId="{FA00299C-1677-4761-8860-DECAFE39DA97}" dt="2018-03-21T06:48:10.249" v="2043" actId="1038"/>
-          <ac:picMkLst>
-            <pc:docMk/>
-            <pc:sldMk cId="3720355804" sldId="263"/>
-            <ac:picMk id="1052" creationId="{C7731B0A-4780-46A9-A31F-B9C283E2B44E}"/>
-          </ac:picMkLst>
-        </pc:picChg>
-        <pc:cxnChg chg="add mod">
-          <ac:chgData name="Shabuddin Khan" userId="6572cdad-dc51-4cbc-b875-d48199489fd3" providerId="ADAL" clId="{FA00299C-1677-4761-8860-DECAFE39DA97}" dt="2018-03-21T06:44:21.885" v="1915" actId="1076"/>
-          <ac:cxnSpMkLst>
-            <pc:docMk/>
-            <pc:sldMk cId="3720355804" sldId="263"/>
-            <ac:cxnSpMk id="1024" creationId="{96290A1F-2F7A-412E-8D53-9AE50B2E6854}"/>
-          </ac:cxnSpMkLst>
-        </pc:cxnChg>
-        <pc:cxnChg chg="add del mod">
-          <ac:chgData name="Shabuddin Khan" userId="6572cdad-dc51-4cbc-b875-d48199489fd3" providerId="ADAL" clId="{FA00299C-1677-4761-8860-DECAFE39DA97}" dt="2018-03-21T06:49:14.454" v="2168" actId="208"/>
-          <ac:cxnSpMkLst>
-            <pc:docMk/>
-            <pc:sldMk cId="3720355804" sldId="263"/>
-            <ac:cxnSpMk id="1028" creationId="{C81721D3-82FC-4519-B8C9-6B62DD564AC0}"/>
-          </ac:cxnSpMkLst>
-        </pc:cxnChg>
-        <pc:cxnChg chg="add del mod">
-          <ac:chgData name="Shabuddin Khan" userId="6572cdad-dc51-4cbc-b875-d48199489fd3" providerId="ADAL" clId="{FA00299C-1677-4761-8860-DECAFE39DA97}" dt="2018-03-21T06:50:22.437" v="2226" actId="1037"/>
-          <ac:cxnSpMkLst>
-            <pc:docMk/>
-            <pc:sldMk cId="3720355804" sldId="263"/>
-            <ac:cxnSpMk id="1030" creationId="{EF93EE49-32A4-4E73-8DDB-D6C64EBC445F}"/>
-          </ac:cxnSpMkLst>
-        </pc:cxnChg>
-        <pc:cxnChg chg="add mod">
-          <ac:chgData name="Shabuddin Khan" userId="6572cdad-dc51-4cbc-b875-d48199489fd3" providerId="ADAL" clId="{FA00299C-1677-4761-8860-DECAFE39DA97}" dt="2018-03-21T06:48:10.249" v="2043" actId="1038"/>
-          <ac:cxnSpMkLst>
-            <pc:docMk/>
-            <pc:sldMk cId="3720355804" sldId="263"/>
-            <ac:cxnSpMk id="1032" creationId="{9C33136D-3B43-416A-8C96-335ABAFDB659}"/>
-          </ac:cxnSpMkLst>
-        </pc:cxnChg>
-      </pc:sldChg>
-      <pc:sldChg chg="addSp delSp modSp add">
-        <pc:chgData name="Shabuddin Khan" userId="6572cdad-dc51-4cbc-b875-d48199489fd3" providerId="ADAL" clId="{FA00299C-1677-4761-8860-DECAFE39DA97}" dt="2018-03-21T16:50:34.334" v="2517" actId="122"/>
-        <pc:sldMkLst>
-          <pc:docMk/>
-          <pc:sldMk cId="1305520245" sldId="264"/>
-        </pc:sldMkLst>
-        <pc:spChg chg="mod">
-          <ac:chgData name="Shabuddin Khan" userId="6572cdad-dc51-4cbc-b875-d48199489fd3" providerId="ADAL" clId="{FA00299C-1677-4761-8860-DECAFE39DA97}" dt="2018-03-21T16:49:45.568" v="2507" actId="27636"/>
-          <ac:spMkLst>
-            <pc:docMk/>
-            <pc:sldMk cId="1305520245" sldId="264"/>
-            <ac:spMk id="2" creationId="{8782ED5D-44B1-40D8-AF4C-E4EADF920B32}"/>
-          </ac:spMkLst>
-        </pc:spChg>
-        <pc:spChg chg="del">
-          <ac:chgData name="Shabuddin Khan" userId="6572cdad-dc51-4cbc-b875-d48199489fd3" providerId="ADAL" clId="{FA00299C-1677-4761-8860-DECAFE39DA97}" dt="2018-03-21T04:57:23.705" v="1155" actId="478"/>
-          <ac:spMkLst>
-            <pc:docMk/>
-            <pc:sldMk cId="1305520245" sldId="264"/>
-            <ac:spMk id="3" creationId="{F41B8C60-7257-4137-8610-8638CD4A5EAC}"/>
-          </ac:spMkLst>
-        </pc:spChg>
-        <pc:graphicFrameChg chg="add mod modGraphic">
-          <ac:chgData name="Shabuddin Khan" userId="6572cdad-dc51-4cbc-b875-d48199489fd3" providerId="ADAL" clId="{FA00299C-1677-4761-8860-DECAFE39DA97}" dt="2018-03-21T16:50:34.334" v="2517" actId="122"/>
-          <ac:graphicFrameMkLst>
-            <pc:docMk/>
-            <pc:sldMk cId="1305520245" sldId="264"/>
-            <ac:graphicFrameMk id="4" creationId="{13546BF2-330C-483D-9AF1-98A668163D1B}"/>
-          </ac:graphicFrameMkLst>
-        </pc:graphicFrameChg>
-      </pc:sldChg>
-    </pc:docChg>
-  </pc:docChgLst>
-  <pc:docChgLst>
-    <pc:chgData name="Shabuddin Khan" userId="6572cdad-dc51-4cbc-b875-d48199489fd3" providerId="ADAL" clId="{5566B4E7-385E-4760-AE0C-7D95B133E340}"/>
-    <pc:docChg chg="modSld">
-      <pc:chgData name="Shabuddin Khan" userId="6572cdad-dc51-4cbc-b875-d48199489fd3" providerId="ADAL" clId="{5566B4E7-385E-4760-AE0C-7D95B133E340}" dt="2018-04-16T14:17:22.446" v="7" actId="20577"/>
-      <pc:docMkLst>
-        <pc:docMk/>
-      </pc:docMkLst>
-      <pc:sldChg chg="modSp">
-        <pc:chgData name="Shabuddin Khan" userId="6572cdad-dc51-4cbc-b875-d48199489fd3" providerId="ADAL" clId="{5566B4E7-385E-4760-AE0C-7D95B133E340}" dt="2018-04-16T14:17:22.446" v="7" actId="20577"/>
-        <pc:sldMkLst>
-          <pc:docMk/>
-          <pc:sldMk cId="892997672" sldId="270"/>
-        </pc:sldMkLst>
-        <pc:spChg chg="mod">
-          <ac:chgData name="Shabuddin Khan" userId="6572cdad-dc51-4cbc-b875-d48199489fd3" providerId="ADAL" clId="{5566B4E7-385E-4760-AE0C-7D95B133E340}" dt="2018-04-16T14:17:22.446" v="7" actId="20577"/>
-          <ac:spMkLst>
-            <pc:docMk/>
-            <pc:sldMk cId="892997672" sldId="270"/>
-            <ac:spMk id="78" creationId="{E8944280-243E-489A-8DF2-319DFF8A8CE2}"/>
-          </ac:spMkLst>
-        </pc:spChg>
-      </pc:sldChg>
-    </pc:docChg>
-  </pc:docChgLst>
-</pc:chgInfo>
 </file>
 
 <file path=ppt/diagrams/colors1.xml><?xml version="1.0" encoding="utf-8"?>
@@ -8513,7 +7948,7 @@
           <a:p>
             <a:fld id="{53C998D3-C819-412A-870D-D0AAEB5CD01C}" type="datetimeFigureOut">
               <a:rPr lang="en-US" smtClean="0"/>
-              <a:t>4/16/2018</a:t>
+              <a:t>4/20/2018</a:t>
             </a:fld>
             <a:endParaRPr lang="en-US"/>
           </a:p>
@@ -8711,7 +8146,7 @@
           <a:p>
             <a:fld id="{53C998D3-C819-412A-870D-D0AAEB5CD01C}" type="datetimeFigureOut">
               <a:rPr lang="en-US" smtClean="0"/>
-              <a:t>4/16/2018</a:t>
+              <a:t>4/20/2018</a:t>
             </a:fld>
             <a:endParaRPr lang="en-US"/>
           </a:p>
@@ -8919,7 +8354,7 @@
           <a:p>
             <a:fld id="{53C998D3-C819-412A-870D-D0AAEB5CD01C}" type="datetimeFigureOut">
               <a:rPr lang="en-US" smtClean="0"/>
-              <a:t>4/16/2018</a:t>
+              <a:t>4/20/2018</a:t>
             </a:fld>
             <a:endParaRPr lang="en-US"/>
           </a:p>
@@ -9127,7 +8562,7 @@
           <a:p>
             <a:fld id="{53C998D3-C819-412A-870D-D0AAEB5CD01C}" type="datetimeFigureOut">
               <a:rPr lang="en-US" smtClean="0"/>
-              <a:t>4/16/2018</a:t>
+              <a:t>4/20/2018</a:t>
             </a:fld>
             <a:endParaRPr lang="en-US"/>
           </a:p>
@@ -9402,7 +8837,7 @@
           <a:p>
             <a:fld id="{53C998D3-C819-412A-870D-D0AAEB5CD01C}" type="datetimeFigureOut">
               <a:rPr lang="en-US" smtClean="0"/>
-              <a:t>4/16/2018</a:t>
+              <a:t>4/20/2018</a:t>
             </a:fld>
             <a:endParaRPr lang="en-US"/>
           </a:p>
@@ -9667,7 +9102,7 @@
           <a:p>
             <a:fld id="{53C998D3-C819-412A-870D-D0AAEB5CD01C}" type="datetimeFigureOut">
               <a:rPr lang="en-US" smtClean="0"/>
-              <a:t>4/16/2018</a:t>
+              <a:t>4/20/2018</a:t>
             </a:fld>
             <a:endParaRPr lang="en-US"/>
           </a:p>
@@ -10079,7 +9514,7 @@
           <a:p>
             <a:fld id="{53C998D3-C819-412A-870D-D0AAEB5CD01C}" type="datetimeFigureOut">
               <a:rPr lang="en-US" smtClean="0"/>
-              <a:t>4/16/2018</a:t>
+              <a:t>4/20/2018</a:t>
             </a:fld>
             <a:endParaRPr lang="en-US"/>
           </a:p>
@@ -10227,7 +9662,7 @@
           <a:p>
             <a:fld id="{53C998D3-C819-412A-870D-D0AAEB5CD01C}" type="datetimeFigureOut">
               <a:rPr lang="en-US" smtClean="0"/>
-              <a:t>4/16/2018</a:t>
+              <a:t>4/20/2018</a:t>
             </a:fld>
             <a:endParaRPr lang="en-US"/>
           </a:p>
@@ -10386,7 +9821,7 @@
           <a:p>
             <a:fld id="{53C998D3-C819-412A-870D-D0AAEB5CD01C}" type="datetimeFigureOut">
               <a:rPr lang="en-US" smtClean="0"/>
-              <a:t>4/16/2018</a:t>
+              <a:t>4/20/2018</a:t>
             </a:fld>
             <a:endParaRPr lang="en-US"/>
           </a:p>
@@ -10697,7 +10132,7 @@
           <a:p>
             <a:fld id="{53C998D3-C819-412A-870D-D0AAEB5CD01C}" type="datetimeFigureOut">
               <a:rPr lang="en-US" smtClean="0"/>
-              <a:t>4/16/2018</a:t>
+              <a:t>4/20/2018</a:t>
             </a:fld>
             <a:endParaRPr lang="en-US"/>
           </a:p>
@@ -10988,7 +10423,7 @@
           <a:p>
             <a:fld id="{53C998D3-C819-412A-870D-D0AAEB5CD01C}" type="datetimeFigureOut">
               <a:rPr lang="en-US" smtClean="0"/>
-              <a:t>4/16/2018</a:t>
+              <a:t>4/20/2018</a:t>
             </a:fld>
             <a:endParaRPr lang="en-US"/>
           </a:p>
@@ -11238,7 +10673,7 @@
           <a:p>
             <a:fld id="{53C998D3-C819-412A-870D-D0AAEB5CD01C}" type="datetimeFigureOut">
               <a:rPr lang="en-US" smtClean="0"/>
-              <a:t>4/16/2018</a:t>
+              <a:t>4/20/2018</a:t>
             </a:fld>
             <a:endParaRPr lang="en-US"/>
           </a:p>
@@ -18370,7 +17805,7 @@
                   <a:srgbClr val="FF0000"/>
                 </a:solidFill>
               </a:rPr>
-              <a:t>DPS : Basic</a:t>
+              <a:t>Without DPS</a:t>
             </a:r>
           </a:p>
         </p:txBody>
@@ -18390,7 +17825,7 @@
         <p:spPr>
           <a:xfrm>
             <a:off x="6869179" y="5221482"/>
-            <a:ext cx="1638955" cy="369332"/>
+            <a:ext cx="2010837" cy="369332"/>
           </a:xfrm>
           <a:prstGeom prst="rect">
             <a:avLst/>
@@ -18409,7 +17844,7 @@
                   <a:schemeClr val="accent6"/>
                 </a:solidFill>
               </a:rPr>
-              <a:t>DPS : Standard</a:t>
+              <a:t>With DPS Standard</a:t>
             </a:r>
           </a:p>
         </p:txBody>
@@ -20135,125 +19570,6 @@
       <p:bldP spid="41" grpId="0"/>
     </p:bldLst>
   </p:timing>
-</p:sld>
-</file>
-
-<file path=ppt/slides/slide16.xml><?xml version="1.0" encoding="utf-8"?>
-<p:sld xmlns:a="http://schemas.openxmlformats.org/drawingml/2006/main" xmlns:r="http://schemas.openxmlformats.org/officeDocument/2006/relationships" xmlns:p="http://schemas.openxmlformats.org/presentationml/2006/main">
-  <p:cSld>
-    <p:spTree>
-      <p:nvGrpSpPr>
-        <p:cNvPr id="1" name=""/>
-        <p:cNvGrpSpPr/>
-        <p:nvPr/>
-      </p:nvGrpSpPr>
-      <p:grpSpPr>
-        <a:xfrm>
-          <a:off x="0" y="0"/>
-          <a:ext cx="0" cy="0"/>
-          <a:chOff x="0" y="0"/>
-          <a:chExt cx="0" cy="0"/>
-        </a:xfrm>
-      </p:grpSpPr>
-      <p:pic>
-        <p:nvPicPr>
-          <p:cNvPr id="2050" name="Picture 2" descr="Azure DDoS Protection Service offerings">
-            <a:extLst>
-              <a:ext uri="{FF2B5EF4-FFF2-40B4-BE49-F238E27FC236}">
-                <a16:creationId xmlns:a16="http://schemas.microsoft.com/office/drawing/2014/main" id="{826DF1F5-0E76-4D6D-BAFD-E09F707EF2B1}"/>
-              </a:ext>
-            </a:extLst>
-          </p:cNvPr>
-          <p:cNvPicPr>
-            <a:picLocks noGrp="1" noChangeAspect="1" noChangeArrowheads="1"/>
-          </p:cNvPicPr>
-          <p:nvPr>
-            <p:ph idx="1"/>
-          </p:nvPr>
-        </p:nvPicPr>
-        <p:blipFill>
-          <a:blip r:embed="rId2">
-            <a:extLst>
-              <a:ext uri="{28A0092B-C50C-407E-A947-70E740481C1C}">
-                <a14:useLocalDpi xmlns:a14="http://schemas.microsoft.com/office/drawing/2010/main" val="0"/>
-              </a:ext>
-            </a:extLst>
-          </a:blip>
-          <a:srcRect/>
-          <a:stretch>
-            <a:fillRect/>
-          </a:stretch>
-        </p:blipFill>
-        <p:spPr bwMode="auto">
-          <a:xfrm>
-            <a:off x="1529335" y="1593318"/>
-            <a:ext cx="9161905" cy="4190476"/>
-          </a:xfrm>
-          <a:prstGeom prst="rect">
-            <a:avLst/>
-          </a:prstGeom>
-          <a:noFill/>
-          <a:extLst>
-            <a:ext uri="{909E8E84-426E-40DD-AFC4-6F175D3DCCD1}">
-              <a14:hiddenFill xmlns:a14="http://schemas.microsoft.com/office/drawing/2010/main">
-                <a:solidFill>
-                  <a:srgbClr val="FFFFFF"/>
-                </a:solidFill>
-              </a14:hiddenFill>
-            </a:ext>
-          </a:extLst>
-        </p:spPr>
-      </p:pic>
-      <p:sp>
-        <p:nvSpPr>
-          <p:cNvPr id="4" name="Rectangle 3">
-            <a:extLst>
-              <a:ext uri="{FF2B5EF4-FFF2-40B4-BE49-F238E27FC236}">
-                <a16:creationId xmlns:a16="http://schemas.microsoft.com/office/drawing/2014/main" id="{54E80E1E-BB7E-478F-A3D5-8F21977C7314}"/>
-              </a:ext>
-            </a:extLst>
-          </p:cNvPr>
-          <p:cNvSpPr/>
-          <p:nvPr/>
-        </p:nvSpPr>
-        <p:spPr>
-          <a:xfrm>
-            <a:off x="1529335" y="6196497"/>
-            <a:ext cx="9821839" cy="369332"/>
-          </a:xfrm>
-          <a:prstGeom prst="rect">
-            <a:avLst/>
-          </a:prstGeom>
-        </p:spPr>
-        <p:txBody>
-          <a:bodyPr wrap="square">
-            <a:spAutoFit/>
-          </a:bodyPr>
-          <a:lstStyle/>
-          <a:p>
-            <a:r>
-              <a:rPr lang="en-US" dirty="0">
-                <a:hlinkClick r:id="rId3"/>
-              </a:rPr>
-              <a:t>https://azure.microsoft.com/en-in/blog/azure-ddos-protection-service-preview/</a:t>
-            </a:r>
-            <a:r>
-              <a:rPr lang="en-US" dirty="0"/>
-              <a:t> </a:t>
-            </a:r>
-          </a:p>
-        </p:txBody>
-      </p:sp>
-    </p:spTree>
-    <p:extLst>
-      <p:ext uri="{BB962C8B-B14F-4D97-AF65-F5344CB8AC3E}">
-        <p14:creationId xmlns:p14="http://schemas.microsoft.com/office/powerpoint/2010/main" val="826921587"/>
-      </p:ext>
-    </p:extLst>
-  </p:cSld>
-  <p:clrMapOvr>
-    <a:masterClrMapping/>
-  </p:clrMapOvr>
 </p:sld>
 </file>
 
@@ -33327,6 +32643,21 @@
 </file>
 
 <file path=customXml/item1.xml><?xml version="1.0" encoding="utf-8"?>
+<?mso-contentType ?>
+<FormTemplates xmlns="http://schemas.microsoft.com/sharepoint/v3/contenttype/forms">
+  <Display>DocumentLibraryForm</Display>
+  <Edit>DocumentLibraryForm</Edit>
+  <New>DocumentLibraryForm</New>
+</FormTemplates>
+</file>
+
+<file path=customXml/item2.xml><?xml version="1.0" encoding="utf-8"?>
+<p:properties xmlns:p="http://schemas.microsoft.com/office/2006/metadata/properties" xmlns:xsi="http://www.w3.org/2001/XMLSchema-instance" xmlns:pc="http://schemas.microsoft.com/office/infopath/2007/PartnerControls">
+  <documentManagement/>
+</p:properties>
+</file>
+
+<file path=customXml/item3.xml><?xml version="1.0" encoding="utf-8"?>
 <ct:contentTypeSchema xmlns:ct="http://schemas.microsoft.com/office/2006/metadata/contentType" xmlns:ma="http://schemas.microsoft.com/office/2006/metadata/properties/metaAttributes" ct:_="" ma:_="" ma:contentTypeName="Document" ma:contentTypeID="0x0101003D63ADDD7F57C84B8D529CA73E1B98CB" ma:contentTypeVersion="7" ma:contentTypeDescription="Create a new document." ma:contentTypeScope="" ma:versionID="9064f22c5fb9dbe79858a8cdf6e712ce">
   <xsd:schema xmlns:xsd="http://www.w3.org/2001/XMLSchema" xmlns:xs="http://www.w3.org/2001/XMLSchema" xmlns:p="http://schemas.microsoft.com/office/2006/metadata/properties" xmlns:ns2="0a1749d7-1680-4b4c-ac1a-b66627f7b711" xmlns:ns3="625b0429-57c0-41ed-b4b9-cb84fb06689a" targetNamespace="http://schemas.microsoft.com/office/2006/metadata/properties" ma:root="true" ma:fieldsID="cf1e750c1e05d2200690044012d38e6b" ns2:_="" ns3:_="">
     <xsd:import namespace="0a1749d7-1680-4b4c-ac1a-b66627f7b711"/>
@@ -33511,22 +32842,32 @@
 </ct:contentTypeSchema>
 </file>
 
-<file path=customXml/item2.xml><?xml version="1.0" encoding="utf-8"?>
-<?mso-contentType ?>
-<FormTemplates xmlns="http://schemas.microsoft.com/sharepoint/v3/contenttype/forms">
-  <Display>DocumentLibraryForm</Display>
-  <Edit>DocumentLibraryForm</Edit>
-  <New>DocumentLibraryForm</New>
-</FormTemplates>
+<file path=customXml/itemProps1.xml><?xml version="1.0" encoding="utf-8"?>
+<ds:datastoreItem xmlns:ds="http://schemas.openxmlformats.org/officeDocument/2006/customXml" ds:itemID="{B3F2B111-B156-46F7-9CCE-060B68D70E39}">
+  <ds:schemaRefs>
+    <ds:schemaRef ds:uri="http://schemas.microsoft.com/sharepoint/v3/contenttype/forms"/>
+  </ds:schemaRefs>
+</ds:datastoreItem>
 </file>
 
-<file path=customXml/item3.xml><?xml version="1.0" encoding="utf-8"?>
-<p:properties xmlns:p="http://schemas.microsoft.com/office/2006/metadata/properties" xmlns:xsi="http://www.w3.org/2001/XMLSchema-instance" xmlns:pc="http://schemas.microsoft.com/office/infopath/2007/PartnerControls">
-  <documentManagement/>
-</p:properties>
+<file path=customXml/itemProps2.xml><?xml version="1.0" encoding="utf-8"?>
+<ds:datastoreItem xmlns:ds="http://schemas.openxmlformats.org/officeDocument/2006/customXml" ds:itemID="{2BC4359B-39BF-4631-A3A8-18D4D323FA7C}">
+  <ds:schemaRefs>
+    <ds:schemaRef ds:uri="http://purl.org/dc/elements/1.1/"/>
+    <ds:schemaRef ds:uri="http://schemas.microsoft.com/office/2006/metadata/properties"/>
+    <ds:schemaRef ds:uri="625b0429-57c0-41ed-b4b9-cb84fb06689a"/>
+    <ds:schemaRef ds:uri="0a1749d7-1680-4b4c-ac1a-b66627f7b711"/>
+    <ds:schemaRef ds:uri="http://purl.org/dc/terms/"/>
+    <ds:schemaRef ds:uri="http://schemas.openxmlformats.org/package/2006/metadata/core-properties"/>
+    <ds:schemaRef ds:uri="http://purl.org/dc/dcmitype/"/>
+    <ds:schemaRef ds:uri="http://schemas.microsoft.com/office/2006/documentManagement/types"/>
+    <ds:schemaRef ds:uri="http://schemas.microsoft.com/office/infopath/2007/PartnerControls"/>
+    <ds:schemaRef ds:uri="http://www.w3.org/XML/1998/namespace"/>
+  </ds:schemaRefs>
+</ds:datastoreItem>
 </file>
 
-<file path=customXml/itemProps1.xml><?xml version="1.0" encoding="utf-8"?>
+<file path=customXml/itemProps3.xml><?xml version="1.0" encoding="utf-8"?>
 <ds:datastoreItem xmlns:ds="http://schemas.openxmlformats.org/officeDocument/2006/customXml" ds:itemID="{4603885D-4C39-42A8-AC71-854EFA531F1A}">
   <ds:schemaRefs>
     <ds:schemaRef ds:uri="http://schemas.microsoft.com/office/2006/metadata/contentType"/>
@@ -33543,29 +32884,4 @@
     <ds:schemaRef ds:uri="http://schemas.microsoft.com/internal/obd"/>
   </ds:schemaRefs>
 </ds:datastoreItem>
-</file>
-
-<file path=customXml/itemProps2.xml><?xml version="1.0" encoding="utf-8"?>
-<ds:datastoreItem xmlns:ds="http://schemas.openxmlformats.org/officeDocument/2006/customXml" ds:itemID="{B3F2B111-B156-46F7-9CCE-060B68D70E39}">
-  <ds:schemaRefs>
-    <ds:schemaRef ds:uri="http://schemas.microsoft.com/sharepoint/v3/contenttype/forms"/>
-  </ds:schemaRefs>
-</ds:datastoreItem>
-</file>
-
-<file path=customXml/itemProps3.xml><?xml version="1.0" encoding="utf-8"?>
-<ds:datastoreItem xmlns:ds="http://schemas.openxmlformats.org/officeDocument/2006/customXml" ds:itemID="{2BC4359B-39BF-4631-A3A8-18D4D323FA7C}">
-  <ds:schemaRefs>
-    <ds:schemaRef ds:uri="http://purl.org/dc/terms/"/>
-    <ds:schemaRef ds:uri="http://schemas.openxmlformats.org/package/2006/metadata/core-properties"/>
-    <ds:schemaRef ds:uri="http://purl.org/dc/dcmitype/"/>
-    <ds:schemaRef ds:uri="http://schemas.microsoft.com/office/infopath/2007/PartnerControls"/>
-    <ds:schemaRef ds:uri="http://schemas.microsoft.com/office/2006/documentManagement/types"/>
-    <ds:schemaRef ds:uri="http://purl.org/dc/elements/1.1/"/>
-    <ds:schemaRef ds:uri="http://schemas.microsoft.com/office/2006/metadata/properties"/>
-    <ds:schemaRef ds:uri="625b0429-57c0-41ed-b4b9-cb84fb06689a"/>
-    <ds:schemaRef ds:uri="0a1749d7-1680-4b4c-ac1a-b66627f7b711"/>
-    <ds:schemaRef ds:uri="http://www.w3.org/XML/1998/namespace"/>
-  </ds:schemaRefs>
-</ds:datastoreItem>
 </file>
</xml_diff>